<commit_message>
final changes before pre-print ready!
</commit_message>
<xml_diff>
--- a/manuscript/images/image_makers/unknown_start.pptx
+++ b/manuscript/images/image_makers/unknown_start.pptx
@@ -5,8 +5,7 @@
     <p:sldMasterId id="2147483648" r:id="rId1"/>
   </p:sldMasterIdLst>
   <p:sldIdLst>
-    <p:sldId id="256" r:id="rId2"/>
-    <p:sldId id="257" r:id="rId3"/>
+    <p:sldId id="257" r:id="rId2"/>
   </p:sldIdLst>
   <p:sldSz cx="12192000" cy="6858000"/>
   <p:notesSz cx="6858000" cy="9144000"/>
@@ -260,7 +259,7 @@
           <a:p>
             <a:fld id="{E034BE7E-E5E5-6147-AE81-F650F3D8C427}" type="datetimeFigureOut">
               <a:rPr lang="nl-NL" smtClean="0"/>
-              <a:t>20-06-2023</a:t>
+              <a:t>15-12-2023</a:t>
             </a:fld>
             <a:endParaRPr lang="nl-NL"/>
           </a:p>
@@ -458,7 +457,7 @@
           <a:p>
             <a:fld id="{E034BE7E-E5E5-6147-AE81-F650F3D8C427}" type="datetimeFigureOut">
               <a:rPr lang="nl-NL" smtClean="0"/>
-              <a:t>20-06-2023</a:t>
+              <a:t>15-12-2023</a:t>
             </a:fld>
             <a:endParaRPr lang="nl-NL"/>
           </a:p>
@@ -666,7 +665,7 @@
           <a:p>
             <a:fld id="{E034BE7E-E5E5-6147-AE81-F650F3D8C427}" type="datetimeFigureOut">
               <a:rPr lang="nl-NL" smtClean="0"/>
-              <a:t>20-06-2023</a:t>
+              <a:t>15-12-2023</a:t>
             </a:fld>
             <a:endParaRPr lang="nl-NL"/>
           </a:p>
@@ -864,7 +863,7 @@
           <a:p>
             <a:fld id="{E034BE7E-E5E5-6147-AE81-F650F3D8C427}" type="datetimeFigureOut">
               <a:rPr lang="nl-NL" smtClean="0"/>
-              <a:t>20-06-2023</a:t>
+              <a:t>15-12-2023</a:t>
             </a:fld>
             <a:endParaRPr lang="nl-NL"/>
           </a:p>
@@ -1139,7 +1138,7 @@
           <a:p>
             <a:fld id="{E034BE7E-E5E5-6147-AE81-F650F3D8C427}" type="datetimeFigureOut">
               <a:rPr lang="nl-NL" smtClean="0"/>
-              <a:t>20-06-2023</a:t>
+              <a:t>15-12-2023</a:t>
             </a:fld>
             <a:endParaRPr lang="nl-NL"/>
           </a:p>
@@ -1404,7 +1403,7 @@
           <a:p>
             <a:fld id="{E034BE7E-E5E5-6147-AE81-F650F3D8C427}" type="datetimeFigureOut">
               <a:rPr lang="nl-NL" smtClean="0"/>
-              <a:t>20-06-2023</a:t>
+              <a:t>15-12-2023</a:t>
             </a:fld>
             <a:endParaRPr lang="nl-NL"/>
           </a:p>
@@ -1816,7 +1815,7 @@
           <a:p>
             <a:fld id="{E034BE7E-E5E5-6147-AE81-F650F3D8C427}" type="datetimeFigureOut">
               <a:rPr lang="nl-NL" smtClean="0"/>
-              <a:t>20-06-2023</a:t>
+              <a:t>15-12-2023</a:t>
             </a:fld>
             <a:endParaRPr lang="nl-NL"/>
           </a:p>
@@ -1957,7 +1956,7 @@
           <a:p>
             <a:fld id="{E034BE7E-E5E5-6147-AE81-F650F3D8C427}" type="datetimeFigureOut">
               <a:rPr lang="nl-NL" smtClean="0"/>
-              <a:t>20-06-2023</a:t>
+              <a:t>15-12-2023</a:t>
             </a:fld>
             <a:endParaRPr lang="nl-NL"/>
           </a:p>
@@ -2070,7 +2069,7 @@
           <a:p>
             <a:fld id="{E034BE7E-E5E5-6147-AE81-F650F3D8C427}" type="datetimeFigureOut">
               <a:rPr lang="nl-NL" smtClean="0"/>
-              <a:t>20-06-2023</a:t>
+              <a:t>15-12-2023</a:t>
             </a:fld>
             <a:endParaRPr lang="nl-NL"/>
           </a:p>
@@ -2381,7 +2380,7 @@
           <a:p>
             <a:fld id="{E034BE7E-E5E5-6147-AE81-F650F3D8C427}" type="datetimeFigureOut">
               <a:rPr lang="nl-NL" smtClean="0"/>
-              <a:t>20-06-2023</a:t>
+              <a:t>15-12-2023</a:t>
             </a:fld>
             <a:endParaRPr lang="nl-NL"/>
           </a:p>
@@ -2669,7 +2668,7 @@
           <a:p>
             <a:fld id="{E034BE7E-E5E5-6147-AE81-F650F3D8C427}" type="datetimeFigureOut">
               <a:rPr lang="nl-NL" smtClean="0"/>
-              <a:t>20-06-2023</a:t>
+              <a:t>15-12-2023</a:t>
             </a:fld>
             <a:endParaRPr lang="nl-NL"/>
           </a:p>
@@ -2910,7 +2909,7 @@
           <a:p>
             <a:fld id="{E034BE7E-E5E5-6147-AE81-F650F3D8C427}" type="datetimeFigureOut">
               <a:rPr lang="nl-NL" smtClean="0"/>
-              <a:t>20-06-2023</a:t>
+              <a:t>15-12-2023</a:t>
             </a:fld>
             <a:endParaRPr lang="nl-NL"/>
           </a:p>
@@ -3520,8 +3519,8 @@
         </p:nvSpPr>
         <p:spPr>
           <a:xfrm>
-            <a:off x="2032169" y="2769692"/>
-            <a:ext cx="495649" cy="307777"/>
+            <a:off x="1925592" y="3043340"/>
+            <a:ext cx="659155" cy="369332"/>
           </a:xfrm>
           <a:prstGeom prst="rect">
             <a:avLst/>
@@ -3535,7 +3534,11 @@
           <a:lstStyle/>
           <a:p>
             <a:r>
-              <a:rPr lang="nl-NL" sz="1400" dirty="0"/>
+              <a:rPr lang="nl-NL" i="1" dirty="0">
+                <a:latin typeface="CMU Serif" panose="02000603000000000000" pitchFamily="2" charset="0"/>
+                <a:ea typeface="CMU Serif" panose="02000603000000000000" pitchFamily="2" charset="0"/>
+                <a:cs typeface="CMU Serif" panose="02000603000000000000" pitchFamily="2" charset="0"/>
+              </a:rPr>
               <a:t>k - d</a:t>
             </a:r>
           </a:p>
@@ -3645,8 +3648,8 @@
         </p:nvSpPr>
         <p:spPr>
           <a:xfrm>
-            <a:off x="3011218" y="2772728"/>
-            <a:ext cx="530915" cy="307777"/>
+            <a:off x="3138983" y="3052650"/>
+            <a:ext cx="365806" cy="369332"/>
           </a:xfrm>
           <a:prstGeom prst="rect">
             <a:avLst/>
@@ -3660,8 +3663,20 @@
           <a:lstStyle/>
           <a:p>
             <a:r>
-              <a:rPr lang="nl-NL" sz="1400" dirty="0"/>
-              <a:t>k = d</a:t>
+              <a:rPr lang="nl-NL" i="1" dirty="0">
+                <a:latin typeface="CMU Serif" panose="02000603000000000000" pitchFamily="2" charset="0"/>
+                <a:ea typeface="CMU Serif" panose="02000603000000000000" pitchFamily="2" charset="0"/>
+                <a:cs typeface="CMU Serif" panose="02000603000000000000" pitchFamily="2" charset="0"/>
+              </a:rPr>
+              <a:t>k</a:t>
+            </a:r>
+            <a:r>
+              <a:rPr lang="nl-NL" sz="1400" i="1" dirty="0">
+                <a:latin typeface="CMU Serif" panose="02000603000000000000" pitchFamily="2" charset="0"/>
+                <a:ea typeface="CMU Serif" panose="02000603000000000000" pitchFamily="2" charset="0"/>
+                <a:cs typeface="CMU Serif" panose="02000603000000000000" pitchFamily="2" charset="0"/>
+              </a:rPr>
+              <a:t> </a:t>
             </a:r>
           </a:p>
         </p:txBody>
@@ -3815,8 +3830,8 @@
         </p:nvSpPr>
         <p:spPr>
           <a:xfrm>
-            <a:off x="1737325" y="1996200"/>
-            <a:ext cx="308098" cy="307777"/>
+            <a:off x="1674082" y="1909576"/>
+            <a:ext cx="407484" cy="461665"/>
           </a:xfrm>
           <a:prstGeom prst="rect">
             <a:avLst/>
@@ -3830,13 +3845,26 @@
           <a:lstStyle/>
           <a:p>
             <a:r>
-              <a:rPr lang="nl-NL" sz="1400" dirty="0"/>
+              <a:rPr lang="nl-NL" sz="2400" dirty="0">
+                <a:latin typeface="CMU Serif Roman" panose="02000603000000000000" pitchFamily="2" charset="0"/>
+                <a:ea typeface="CMU Serif Roman" panose="02000603000000000000" pitchFamily="2" charset="0"/>
+                <a:cs typeface="CMU Serif Roman" panose="02000603000000000000" pitchFamily="2" charset="0"/>
+              </a:rPr>
               <a:t>r</a:t>
             </a:r>
             <a:r>
-              <a:rPr lang="nl-NL" sz="1400" baseline="-25000" dirty="0"/>
+              <a:rPr lang="nl-NL" sz="2400" baseline="-25000" dirty="0">
+                <a:latin typeface="CMU Serif Roman" panose="02000603000000000000" pitchFamily="2" charset="0"/>
+                <a:ea typeface="CMU Serif Roman" panose="02000603000000000000" pitchFamily="2" charset="0"/>
+                <a:cs typeface="CMU Serif Roman" panose="02000603000000000000" pitchFamily="2" charset="0"/>
+              </a:rPr>
               <a:t>1</a:t>
             </a:r>
+            <a:endParaRPr lang="nl-NL" sz="1600" baseline="-25000" dirty="0">
+              <a:latin typeface="CMU Serif Roman" panose="02000603000000000000" pitchFamily="2" charset="0"/>
+              <a:ea typeface="CMU Serif Roman" panose="02000603000000000000" pitchFamily="2" charset="0"/>
+              <a:cs typeface="CMU Serif Roman" panose="02000603000000000000" pitchFamily="2" charset="0"/>
+            </a:endParaRPr>
           </a:p>
         </p:txBody>
       </p:sp>
@@ -3854,8 +3882,8 @@
         </p:nvSpPr>
         <p:spPr>
           <a:xfrm>
-            <a:off x="1737325" y="2338016"/>
-            <a:ext cx="308098" cy="307777"/>
+            <a:off x="1672273" y="2274313"/>
+            <a:ext cx="407484" cy="461665"/>
           </a:xfrm>
           <a:prstGeom prst="rect">
             <a:avLst/>
@@ -3869,11 +3897,19 @@
           <a:lstStyle/>
           <a:p>
             <a:r>
-              <a:rPr lang="nl-NL" sz="1400" dirty="0"/>
+              <a:rPr lang="nl-NL" sz="2400" dirty="0">
+                <a:latin typeface="CMU Serif Roman" panose="02000603000000000000" pitchFamily="2" charset="0"/>
+                <a:ea typeface="CMU Serif Roman" panose="02000603000000000000" pitchFamily="2" charset="0"/>
+                <a:cs typeface="CMU Serif Roman" panose="02000603000000000000" pitchFamily="2" charset="0"/>
+              </a:rPr>
               <a:t>r</a:t>
             </a:r>
             <a:r>
-              <a:rPr lang="nl-NL" sz="1400" baseline="-25000" dirty="0"/>
+              <a:rPr lang="nl-NL" sz="2400" baseline="-25000" dirty="0">
+                <a:latin typeface="CMU Serif Roman" panose="02000603000000000000" pitchFamily="2" charset="0"/>
+                <a:ea typeface="CMU Serif Roman" panose="02000603000000000000" pitchFamily="2" charset="0"/>
+                <a:cs typeface="CMU Serif Roman" panose="02000603000000000000" pitchFamily="2" charset="0"/>
+              </a:rPr>
               <a:t>0</a:t>
             </a:r>
           </a:p>
@@ -4072,8 +4108,8 @@
         </p:nvSpPr>
         <p:spPr>
           <a:xfrm>
-            <a:off x="4529125" y="2777840"/>
-            <a:ext cx="495649" cy="307777"/>
+            <a:off x="4447620" y="3052650"/>
+            <a:ext cx="665567" cy="369332"/>
           </a:xfrm>
           <a:prstGeom prst="rect">
             <a:avLst/>
@@ -4087,7 +4123,11 @@
           <a:lstStyle/>
           <a:p>
             <a:r>
-              <a:rPr lang="nl-NL" sz="1400" dirty="0"/>
+              <a:rPr lang="nl-NL" i="1" dirty="0">
+                <a:latin typeface="CMU Serif" panose="02000603000000000000" pitchFamily="2" charset="0"/>
+                <a:ea typeface="CMU Serif" panose="02000603000000000000" pitchFamily="2" charset="0"/>
+                <a:cs typeface="CMU Serif" panose="02000603000000000000" pitchFamily="2" charset="0"/>
+              </a:rPr>
               <a:t>k - d</a:t>
             </a:r>
           </a:p>
@@ -4197,8 +4237,8 @@
         </p:nvSpPr>
         <p:spPr>
           <a:xfrm>
-            <a:off x="5036086" y="2777840"/>
-            <a:ext cx="530915" cy="307777"/>
+            <a:off x="5168546" y="3052650"/>
+            <a:ext cx="290464" cy="369332"/>
           </a:xfrm>
           <a:prstGeom prst="rect">
             <a:avLst/>
@@ -4212,8 +4252,12 @@
           <a:lstStyle/>
           <a:p>
             <a:r>
-              <a:rPr lang="nl-NL" sz="1400" dirty="0"/>
-              <a:t>k = p</a:t>
+              <a:rPr lang="nl-NL" i="1" dirty="0">
+                <a:latin typeface="CMU Serif" panose="02000603000000000000" pitchFamily="2" charset="0"/>
+                <a:ea typeface="CMU Serif" panose="02000603000000000000" pitchFamily="2" charset="0"/>
+                <a:cs typeface="CMU Serif" panose="02000603000000000000" pitchFamily="2" charset="0"/>
+              </a:rPr>
+              <a:t>k</a:t>
             </a:r>
           </a:p>
         </p:txBody>
@@ -4355,10 +4399,10 @@
       </p:cxnSp>
       <p:sp>
         <p:nvSpPr>
-          <p:cNvPr id="64" name="Tekstvak 63">
-            <a:extLst>
-              <a:ext uri="{FF2B5EF4-FFF2-40B4-BE49-F238E27FC236}">
-                <a16:creationId xmlns:a16="http://schemas.microsoft.com/office/drawing/2014/main" id="{383A9196-53F0-C3CC-85F9-1346FBACC424}"/>
+          <p:cNvPr id="70" name="Tekstvak 69">
+            <a:extLst>
+              <a:ext uri="{FF2B5EF4-FFF2-40B4-BE49-F238E27FC236}">
+                <a16:creationId xmlns:a16="http://schemas.microsoft.com/office/drawing/2014/main" id="{45015B53-AAEA-C993-2AD3-6FEE70004968}"/>
               </a:ext>
             </a:extLst>
           </p:cNvPr>
@@ -4367,8 +4411,8 @@
         </p:nvSpPr>
         <p:spPr>
           <a:xfrm>
-            <a:off x="3768969" y="1996200"/>
-            <a:ext cx="308098" cy="307777"/>
+            <a:off x="2181108" y="1609090"/>
+            <a:ext cx="1415772" cy="338554"/>
           </a:xfrm>
           <a:prstGeom prst="rect">
             <a:avLst/>
@@ -4382,22 +4426,27 @@
           <a:lstStyle/>
           <a:p>
             <a:r>
-              <a:rPr lang="nl-NL" sz="1400" dirty="0"/>
-              <a:t>r</a:t>
-            </a:r>
-            <a:r>
-              <a:rPr lang="nl-NL" sz="1400" baseline="-25000" dirty="0"/>
-              <a:t>1</a:t>
-            </a:r>
-          </a:p>
-        </p:txBody>
-      </p:sp>
-      <p:sp>
-        <p:nvSpPr>
-          <p:cNvPr id="65" name="Tekstvak 64">
-            <a:extLst>
-              <a:ext uri="{FF2B5EF4-FFF2-40B4-BE49-F238E27FC236}">
-                <a16:creationId xmlns:a16="http://schemas.microsoft.com/office/drawing/2014/main" id="{F255FFFE-84FB-5F2E-8BBD-FF30F281B5DF}"/>
+              <a:rPr lang="nl-NL" sz="1600" dirty="0" err="1">
+                <a:latin typeface="CMU Serif Roman" panose="02000603000000000000" pitchFamily="2" charset="0"/>
+                <a:ea typeface="CMU Serif Roman" panose="02000603000000000000" pitchFamily="2" charset="0"/>
+                <a:cs typeface="CMU Serif Roman" panose="02000603000000000000" pitchFamily="2" charset="0"/>
+              </a:rPr>
+              <a:t>undetermined</a:t>
+            </a:r>
+            <a:endParaRPr lang="nl-NL" dirty="0">
+              <a:latin typeface="CMU Serif Roman" panose="02000603000000000000" pitchFamily="2" charset="0"/>
+              <a:ea typeface="CMU Serif Roman" panose="02000603000000000000" pitchFamily="2" charset="0"/>
+              <a:cs typeface="CMU Serif Roman" panose="02000603000000000000" pitchFamily="2" charset="0"/>
+            </a:endParaRPr>
+          </a:p>
+        </p:txBody>
+      </p:sp>
+      <p:sp>
+        <p:nvSpPr>
+          <p:cNvPr id="71" name="Tekstvak 70">
+            <a:extLst>
+              <a:ext uri="{FF2B5EF4-FFF2-40B4-BE49-F238E27FC236}">
+                <a16:creationId xmlns:a16="http://schemas.microsoft.com/office/drawing/2014/main" id="{50BD68C0-87AD-C0C8-29F4-AFD0BEE698A1}"/>
               </a:ext>
             </a:extLst>
           </p:cNvPr>
@@ -4406,8 +4455,8 @@
         </p:nvSpPr>
         <p:spPr>
           <a:xfrm>
-            <a:off x="3768969" y="2338016"/>
-            <a:ext cx="308098" cy="307777"/>
+            <a:off x="5570301" y="1170203"/>
+            <a:ext cx="752129" cy="369332"/>
           </a:xfrm>
           <a:prstGeom prst="rect">
             <a:avLst/>
@@ -4421,252 +4470,16 @@
           <a:lstStyle/>
           <a:p>
             <a:r>
-              <a:rPr lang="nl-NL" sz="1400" dirty="0"/>
-              <a:t>r</a:t>
-            </a:r>
-            <a:r>
-              <a:rPr lang="nl-NL" sz="1400" baseline="-25000" dirty="0"/>
-              <a:t>0</a:t>
-            </a:r>
-          </a:p>
-        </p:txBody>
-      </p:sp>
-      <mc:AlternateContent xmlns:mc="http://schemas.openxmlformats.org/markup-compatibility/2006" xmlns:a14="http://schemas.microsoft.com/office/drawing/2010/main">
-        <mc:Choice Requires="a14">
-          <p:sp>
-            <p:nvSpPr>
-              <p:cNvPr id="70" name="Tekstvak 69">
-                <a:extLst>
-                  <a:ext uri="{FF2B5EF4-FFF2-40B4-BE49-F238E27FC236}">
-                    <a16:creationId xmlns:a16="http://schemas.microsoft.com/office/drawing/2014/main" id="{45015B53-AAEA-C993-2AD3-6FEE70004968}"/>
-                  </a:ext>
-                </a:extLst>
-              </p:cNvPr>
-              <p:cNvSpPr txBox="1"/>
-              <p:nvPr/>
-            </p:nvSpPr>
-            <p:spPr>
-              <a:xfrm>
-                <a:off x="2182497" y="1377605"/>
-                <a:ext cx="1377237" cy="615553"/>
-              </a:xfrm>
-              <a:prstGeom prst="rect">
-                <a:avLst/>
-              </a:prstGeom>
-              <a:noFill/>
-            </p:spPr>
-            <p:txBody>
-              <a:bodyPr wrap="none" rtlCol="0">
-                <a:spAutoFit/>
-              </a:bodyPr>
-              <a:lstStyle/>
-              <a:p>
-                <a:pPr/>
-                <a14:m>
-                  <m:oMathPara xmlns:m="http://schemas.openxmlformats.org/officeDocument/2006/math">
-                    <m:oMathParaPr>
-                      <m:jc m:val="centerGroup"/>
-                    </m:oMathParaPr>
-                    <m:oMath xmlns:m="http://schemas.openxmlformats.org/officeDocument/2006/math">
-                      <m:r>
-                        <a:rPr lang="nl-NL" b="0" i="1" smtClean="0">
-                          <a:latin typeface="Cambria Math" panose="02040503050406030204" pitchFamily="18" charset="0"/>
-                          <a:ea typeface="Cambria Math" panose="02040503050406030204" pitchFamily="18" charset="0"/>
-                        </a:rPr>
-                        <m:t>𝑑</m:t>
-                      </m:r>
-                      <m:r>
-                        <a:rPr lang="nl-NL" b="0" i="1" smtClean="0">
-                          <a:latin typeface="Cambria Math" panose="02040503050406030204" pitchFamily="18" charset="0"/>
-                          <a:ea typeface="Cambria Math" panose="02040503050406030204" pitchFamily="18" charset="0"/>
-                        </a:rPr>
-                        <m:t>≥</m:t>
-                      </m:r>
-                      <m:r>
-                        <a:rPr lang="nl-NL" b="0" i="1" smtClean="0">
-                          <a:latin typeface="Cambria Math" panose="02040503050406030204" pitchFamily="18" charset="0"/>
-                          <a:ea typeface="Cambria Math" panose="02040503050406030204" pitchFamily="18" charset="0"/>
-                        </a:rPr>
-                        <m:t>𝑝</m:t>
-                      </m:r>
-                    </m:oMath>
-                  </m:oMathPara>
-                </a14:m>
-                <a:endParaRPr lang="nl-NL" dirty="0"/>
-              </a:p>
-              <a:p>
-                <a:r>
-                  <a:rPr lang="nl-NL" sz="1600" dirty="0" err="1"/>
-                  <a:t>undetermined</a:t>
-                </a:r>
-                <a:endParaRPr lang="nl-NL" dirty="0"/>
-              </a:p>
-            </p:txBody>
-          </p:sp>
-        </mc:Choice>
-        <mc:Fallback xmlns="">
-          <p:sp>
-            <p:nvSpPr>
-              <p:cNvPr id="70" name="Tekstvak 69">
-                <a:extLst>
-                  <a:ext uri="{FF2B5EF4-FFF2-40B4-BE49-F238E27FC236}">
-                    <a16:creationId xmlns:a16="http://schemas.microsoft.com/office/drawing/2014/main" id="{45015B53-AAEA-C993-2AD3-6FEE70004968}"/>
-                  </a:ext>
-                </a:extLst>
-              </p:cNvPr>
-              <p:cNvSpPr txBox="1">
-                <a:spLocks noRot="1" noChangeAspect="1" noMove="1" noResize="1" noEditPoints="1" noAdjustHandles="1" noChangeArrowheads="1" noChangeShapeType="1" noTextEdit="1"/>
-              </p:cNvSpPr>
-              <p:nvPr/>
-            </p:nvSpPr>
-            <p:spPr>
-              <a:xfrm>
-                <a:off x="2182497" y="1377605"/>
-                <a:ext cx="1377237" cy="615553"/>
-              </a:xfrm>
-              <a:prstGeom prst="rect">
-                <a:avLst/>
-              </a:prstGeom>
-              <a:blipFill>
-                <a:blip r:embed="rId2"/>
-                <a:stretch>
-                  <a:fillRect l="-1818" r="-909" b="-12245"/>
-                </a:stretch>
-              </a:blipFill>
-            </p:spPr>
-            <p:txBody>
-              <a:bodyPr/>
-              <a:lstStyle/>
-              <a:p>
-                <a:r>
-                  <a:rPr lang="nl-NL">
-                    <a:noFill/>
-                  </a:rPr>
-                  <a:t> </a:t>
-                </a:r>
-              </a:p>
-            </p:txBody>
-          </p:sp>
-        </mc:Fallback>
-      </mc:AlternateContent>
-      <mc:AlternateContent xmlns:mc="http://schemas.openxmlformats.org/markup-compatibility/2006" xmlns:a14="http://schemas.microsoft.com/office/drawing/2010/main">
-        <mc:Choice Requires="a14">
-          <p:sp>
-            <p:nvSpPr>
-              <p:cNvPr id="71" name="Tekstvak 70">
-                <a:extLst>
-                  <a:ext uri="{FF2B5EF4-FFF2-40B4-BE49-F238E27FC236}">
-                    <a16:creationId xmlns:a16="http://schemas.microsoft.com/office/drawing/2014/main" id="{50BD68C0-87AD-C0C8-29F4-AFD0BEE698A1}"/>
-                  </a:ext>
-                </a:extLst>
-              </p:cNvPr>
-              <p:cNvSpPr txBox="1"/>
-              <p:nvPr/>
-            </p:nvSpPr>
-            <p:spPr>
-              <a:xfrm>
-                <a:off x="4343806" y="1380041"/>
-                <a:ext cx="1162434" cy="615553"/>
-              </a:xfrm>
-              <a:prstGeom prst="rect">
-                <a:avLst/>
-              </a:prstGeom>
-              <a:noFill/>
-            </p:spPr>
-            <p:txBody>
-              <a:bodyPr wrap="none" rtlCol="0">
-                <a:spAutoFit/>
-              </a:bodyPr>
-              <a:lstStyle/>
-              <a:p>
-                <a:pPr/>
-                <a14:m>
-                  <m:oMathPara xmlns:m="http://schemas.openxmlformats.org/officeDocument/2006/math">
-                    <m:oMathParaPr>
-                      <m:jc m:val="centerGroup"/>
-                    </m:oMathParaPr>
-                    <m:oMath xmlns:m="http://schemas.openxmlformats.org/officeDocument/2006/math">
-                      <m:r>
-                        <a:rPr lang="nl-NL" b="0" i="1" smtClean="0">
-                          <a:latin typeface="Cambria Math" panose="02040503050406030204" pitchFamily="18" charset="0"/>
-                          <a:ea typeface="Cambria Math" panose="02040503050406030204" pitchFamily="18" charset="0"/>
-                        </a:rPr>
-                        <m:t>𝑑</m:t>
-                      </m:r>
-                      <m:r>
-                        <a:rPr lang="nl-NL" b="0" i="1" smtClean="0">
-                          <a:latin typeface="Cambria Math" panose="02040503050406030204" pitchFamily="18" charset="0"/>
-                          <a:ea typeface="Cambria Math" panose="02040503050406030204" pitchFamily="18" charset="0"/>
-                        </a:rPr>
-                        <m:t>&lt;</m:t>
-                      </m:r>
-                      <m:r>
-                        <a:rPr lang="nl-NL" b="0" i="1" smtClean="0">
-                          <a:latin typeface="Cambria Math" panose="02040503050406030204" pitchFamily="18" charset="0"/>
-                          <a:ea typeface="Cambria Math" panose="02040503050406030204" pitchFamily="18" charset="0"/>
-                        </a:rPr>
-                        <m:t>𝑝</m:t>
-                      </m:r>
-                    </m:oMath>
-                  </m:oMathPara>
-                </a14:m>
-                <a:endParaRPr lang="nl-NL" dirty="0"/>
-              </a:p>
-              <a:p>
-                <a:r>
-                  <a:rPr lang="nl-NL" sz="1600" dirty="0" err="1"/>
-                  <a:t>determined</a:t>
-                </a:r>
-                <a:endParaRPr lang="nl-NL" dirty="0"/>
-              </a:p>
-            </p:txBody>
-          </p:sp>
-        </mc:Choice>
-        <mc:Fallback xmlns="">
-          <p:sp>
-            <p:nvSpPr>
-              <p:cNvPr id="71" name="Tekstvak 70">
-                <a:extLst>
-                  <a:ext uri="{FF2B5EF4-FFF2-40B4-BE49-F238E27FC236}">
-                    <a16:creationId xmlns:a16="http://schemas.microsoft.com/office/drawing/2014/main" id="{50BD68C0-87AD-C0C8-29F4-AFD0BEE698A1}"/>
-                  </a:ext>
-                </a:extLst>
-              </p:cNvPr>
-              <p:cNvSpPr txBox="1">
-                <a:spLocks noRot="1" noChangeAspect="1" noMove="1" noResize="1" noEditPoints="1" noAdjustHandles="1" noChangeArrowheads="1" noChangeShapeType="1" noTextEdit="1"/>
-              </p:cNvSpPr>
-              <p:nvPr/>
-            </p:nvSpPr>
-            <p:spPr>
-              <a:xfrm>
-                <a:off x="4343806" y="1380041"/>
-                <a:ext cx="1162434" cy="615553"/>
-              </a:xfrm>
-              <a:prstGeom prst="rect">
-                <a:avLst/>
-              </a:prstGeom>
-              <a:blipFill>
-                <a:blip r:embed="rId3"/>
-                <a:stretch>
-                  <a:fillRect l="-3261" r="-2174" b="-14286"/>
-                </a:stretch>
-              </a:blipFill>
-            </p:spPr>
-            <p:txBody>
-              <a:bodyPr/>
-              <a:lstStyle/>
-              <a:p>
-                <a:r>
-                  <a:rPr lang="nl-NL">
-                    <a:noFill/>
-                  </a:rPr>
-                  <a:t> </a:t>
-                </a:r>
-              </a:p>
-            </p:txBody>
-          </p:sp>
-        </mc:Fallback>
-      </mc:AlternateContent>
+              <a:rPr lang="nl-NL" i="1" dirty="0">
+                <a:latin typeface="CMU Serif" panose="02000603000000000000" pitchFamily="2" charset="0"/>
+                <a:ea typeface="CMU Serif" panose="02000603000000000000" pitchFamily="2" charset="0"/>
+                <a:cs typeface="CMU Serif" panose="02000603000000000000" pitchFamily="2" charset="0"/>
+              </a:rPr>
+              <a:t>k &lt; d</a:t>
+            </a:r>
+          </a:p>
+        </p:txBody>
+      </p:sp>
       <p:cxnSp>
         <p:nvCxnSpPr>
           <p:cNvPr id="2" name="Rechte verbindingslijn 1">
@@ -4860,8 +4673,8 @@
         </p:nvSpPr>
         <p:spPr>
           <a:xfrm>
-            <a:off x="6599547" y="2777840"/>
-            <a:ext cx="495649" cy="307777"/>
+            <a:off x="6529702" y="3052650"/>
+            <a:ext cx="665567" cy="369332"/>
           </a:xfrm>
           <a:prstGeom prst="rect">
             <a:avLst/>
@@ -4875,7 +4688,11 @@
           <a:lstStyle/>
           <a:p>
             <a:r>
-              <a:rPr lang="nl-NL" sz="1400" dirty="0"/>
+              <a:rPr lang="nl-NL" i="1" dirty="0">
+                <a:latin typeface="CMU Serif" panose="02000603000000000000" pitchFamily="2" charset="0"/>
+                <a:ea typeface="CMU Serif" panose="02000603000000000000" pitchFamily="2" charset="0"/>
+                <a:cs typeface="CMU Serif" panose="02000603000000000000" pitchFamily="2" charset="0"/>
+              </a:rPr>
               <a:t>k - d</a:t>
             </a:r>
           </a:p>
@@ -4942,7 +4759,7 @@
         </p:nvCxnSpPr>
         <p:spPr>
           <a:xfrm flipH="1">
-            <a:off x="6126809" y="2774197"/>
+            <a:off x="6117595" y="2774197"/>
             <a:ext cx="1749094" cy="0"/>
           </a:xfrm>
           <a:prstGeom prst="line">
@@ -4985,8 +4802,8 @@
         </p:nvSpPr>
         <p:spPr>
           <a:xfrm>
-            <a:off x="7106508" y="2779504"/>
-            <a:ext cx="530915" cy="307777"/>
+            <a:off x="7233535" y="3048335"/>
+            <a:ext cx="290464" cy="369332"/>
           </a:xfrm>
           <a:prstGeom prst="rect">
             <a:avLst/>
@@ -5000,8 +4817,12 @@
           <a:lstStyle/>
           <a:p>
             <a:r>
-              <a:rPr lang="nl-NL" sz="1400" dirty="0"/>
-              <a:t>k = p</a:t>
+              <a:rPr lang="nl-NL" i="1" dirty="0">
+                <a:latin typeface="CMU Serif" panose="02000603000000000000" pitchFamily="2" charset="0"/>
+                <a:ea typeface="CMU Serif" panose="02000603000000000000" pitchFamily="2" charset="0"/>
+                <a:cs typeface="CMU Serif" panose="02000603000000000000" pitchFamily="2" charset="0"/>
+              </a:rPr>
+              <a:t>k</a:t>
             </a:r>
           </a:p>
         </p:txBody>
@@ -5143,10 +4964,10 @@
       </p:cxnSp>
       <p:sp>
         <p:nvSpPr>
-          <p:cNvPr id="18" name="Tekstvak 17">
-            <a:extLst>
-              <a:ext uri="{FF2B5EF4-FFF2-40B4-BE49-F238E27FC236}">
-                <a16:creationId xmlns:a16="http://schemas.microsoft.com/office/drawing/2014/main" id="{510CFF1F-B17F-947A-C997-761BD8F33E51}"/>
+          <p:cNvPr id="20" name="Tekstvak 19">
+            <a:extLst>
+              <a:ext uri="{FF2B5EF4-FFF2-40B4-BE49-F238E27FC236}">
+                <a16:creationId xmlns:a16="http://schemas.microsoft.com/office/drawing/2014/main" id="{43DF2FBA-F408-41AE-9FB1-3326A2FA7FEF}"/>
               </a:ext>
             </a:extLst>
           </p:cNvPr>
@@ -5155,8 +4976,8 @@
         </p:nvSpPr>
         <p:spPr>
           <a:xfrm>
-            <a:off x="5839391" y="1996200"/>
-            <a:ext cx="308098" cy="307777"/>
+            <a:off x="6303523" y="1603216"/>
+            <a:ext cx="1415772" cy="338554"/>
           </a:xfrm>
           <a:prstGeom prst="rect">
             <a:avLst/>
@@ -5170,22 +4991,27 @@
           <a:lstStyle/>
           <a:p>
             <a:r>
-              <a:rPr lang="nl-NL" sz="1400" dirty="0"/>
-              <a:t>r</a:t>
-            </a:r>
-            <a:r>
-              <a:rPr lang="nl-NL" sz="1400" baseline="-25000" dirty="0"/>
-              <a:t>1</a:t>
-            </a:r>
-          </a:p>
-        </p:txBody>
-      </p:sp>
-      <p:sp>
-        <p:nvSpPr>
-          <p:cNvPr id="19" name="Tekstvak 18">
-            <a:extLst>
-              <a:ext uri="{FF2B5EF4-FFF2-40B4-BE49-F238E27FC236}">
-                <a16:creationId xmlns:a16="http://schemas.microsoft.com/office/drawing/2014/main" id="{E22A8794-D928-823D-54B6-5C1134152E4F}"/>
+              <a:rPr lang="nl-NL" sz="1600" dirty="0" err="1">
+                <a:latin typeface="CMU Serif Roman" panose="02000603000000000000" pitchFamily="2" charset="0"/>
+                <a:ea typeface="CMU Serif Roman" panose="02000603000000000000" pitchFamily="2" charset="0"/>
+                <a:cs typeface="CMU Serif Roman" panose="02000603000000000000" pitchFamily="2" charset="0"/>
+              </a:rPr>
+              <a:t>undetermined</a:t>
+            </a:r>
+            <a:endParaRPr lang="nl-NL" dirty="0">
+              <a:latin typeface="CMU Serif Roman" panose="02000603000000000000" pitchFamily="2" charset="0"/>
+              <a:ea typeface="CMU Serif Roman" panose="02000603000000000000" pitchFamily="2" charset="0"/>
+              <a:cs typeface="CMU Serif Roman" panose="02000603000000000000" pitchFamily="2" charset="0"/>
+            </a:endParaRPr>
+          </a:p>
+        </p:txBody>
+      </p:sp>
+      <p:sp>
+        <p:nvSpPr>
+          <p:cNvPr id="21" name="Tekstvak 20">
+            <a:extLst>
+              <a:ext uri="{FF2B5EF4-FFF2-40B4-BE49-F238E27FC236}">
+                <a16:creationId xmlns:a16="http://schemas.microsoft.com/office/drawing/2014/main" id="{33293874-40BA-2E99-970D-61B1F7B4E73B}"/>
               </a:ext>
             </a:extLst>
           </p:cNvPr>
@@ -5194,8 +5020,8 @@
         </p:nvSpPr>
         <p:spPr>
           <a:xfrm>
-            <a:off x="5839391" y="2338016"/>
-            <a:ext cx="308098" cy="307777"/>
+            <a:off x="2138027" y="2788088"/>
+            <a:ext cx="301686" cy="369332"/>
           </a:xfrm>
           <a:prstGeom prst="rect">
             <a:avLst/>
@@ -5209,349 +5035,22 @@
           <a:lstStyle/>
           <a:p>
             <a:r>
-              <a:rPr lang="nl-NL" sz="1400" dirty="0"/>
-              <a:t>r</a:t>
-            </a:r>
-            <a:r>
-              <a:rPr lang="nl-NL" sz="1400" baseline="-25000" dirty="0"/>
+              <a:rPr lang="nl-NL" dirty="0">
+                <a:latin typeface="CMU Serif Roman" panose="02000603000000000000" pitchFamily="2" charset="0"/>
+                <a:ea typeface="CMU Serif Roman" panose="02000603000000000000" pitchFamily="2" charset="0"/>
+                <a:cs typeface="CMU Serif Roman" panose="02000603000000000000" pitchFamily="2" charset="0"/>
+              </a:rPr>
               <a:t>0</a:t>
             </a:r>
           </a:p>
         </p:txBody>
       </p:sp>
-      <mc:AlternateContent xmlns:mc="http://schemas.openxmlformats.org/markup-compatibility/2006" xmlns:a14="http://schemas.microsoft.com/office/drawing/2010/main">
-        <mc:Choice Requires="a14">
-          <p:sp>
-            <p:nvSpPr>
-              <p:cNvPr id="20" name="Tekstvak 19">
-                <a:extLst>
-                  <a:ext uri="{FF2B5EF4-FFF2-40B4-BE49-F238E27FC236}">
-                    <a16:creationId xmlns:a16="http://schemas.microsoft.com/office/drawing/2014/main" id="{43DF2FBA-F408-41AE-9FB1-3326A2FA7FEF}"/>
-                  </a:ext>
-                </a:extLst>
-              </p:cNvPr>
-              <p:cNvSpPr txBox="1"/>
-              <p:nvPr/>
-            </p:nvSpPr>
-            <p:spPr>
-              <a:xfrm>
-                <a:off x="6327500" y="1383783"/>
-                <a:ext cx="1377237" cy="615553"/>
-              </a:xfrm>
-              <a:prstGeom prst="rect">
-                <a:avLst/>
-              </a:prstGeom>
-              <a:noFill/>
-            </p:spPr>
-            <p:txBody>
-              <a:bodyPr wrap="none" rtlCol="0">
-                <a:spAutoFit/>
-              </a:bodyPr>
-              <a:lstStyle/>
-              <a:p>
-                <a:pPr/>
-                <a14:m>
-                  <m:oMathPara xmlns:m="http://schemas.openxmlformats.org/officeDocument/2006/math">
-                    <m:oMathParaPr>
-                      <m:jc m:val="centerGroup"/>
-                    </m:oMathParaPr>
-                    <m:oMath xmlns:m="http://schemas.openxmlformats.org/officeDocument/2006/math">
-                      <m:r>
-                        <a:rPr lang="nl-NL" b="0" i="1" smtClean="0">
-                          <a:latin typeface="Cambria Math" panose="02040503050406030204" pitchFamily="18" charset="0"/>
-                          <a:ea typeface="Cambria Math" panose="02040503050406030204" pitchFamily="18" charset="0"/>
-                        </a:rPr>
-                        <m:t>𝑑</m:t>
-                      </m:r>
-                      <m:r>
-                        <a:rPr lang="nl-NL" b="0" i="1" smtClean="0">
-                          <a:latin typeface="Cambria Math" panose="02040503050406030204" pitchFamily="18" charset="0"/>
-                          <a:ea typeface="Cambria Math" panose="02040503050406030204" pitchFamily="18" charset="0"/>
-                        </a:rPr>
-                        <m:t>&lt;</m:t>
-                      </m:r>
-                      <m:r>
-                        <a:rPr lang="nl-NL" b="0" i="1" smtClean="0">
-                          <a:latin typeface="Cambria Math" panose="02040503050406030204" pitchFamily="18" charset="0"/>
-                          <a:ea typeface="Cambria Math" panose="02040503050406030204" pitchFamily="18" charset="0"/>
-                        </a:rPr>
-                        <m:t>𝑝</m:t>
-                      </m:r>
-                    </m:oMath>
-                  </m:oMathPara>
-                </a14:m>
-                <a:endParaRPr lang="nl-NL" dirty="0"/>
-              </a:p>
-              <a:p>
-                <a:r>
-                  <a:rPr lang="nl-NL" sz="1600" dirty="0" err="1"/>
-                  <a:t>undetermined</a:t>
-                </a:r>
-                <a:endParaRPr lang="nl-NL" dirty="0"/>
-              </a:p>
-            </p:txBody>
-          </p:sp>
-        </mc:Choice>
-        <mc:Fallback xmlns="">
-          <p:sp>
-            <p:nvSpPr>
-              <p:cNvPr id="20" name="Tekstvak 19">
-                <a:extLst>
-                  <a:ext uri="{FF2B5EF4-FFF2-40B4-BE49-F238E27FC236}">
-                    <a16:creationId xmlns:a16="http://schemas.microsoft.com/office/drawing/2014/main" id="{43DF2FBA-F408-41AE-9FB1-3326A2FA7FEF}"/>
-                  </a:ext>
-                </a:extLst>
-              </p:cNvPr>
-              <p:cNvSpPr txBox="1">
-                <a:spLocks noRot="1" noChangeAspect="1" noMove="1" noResize="1" noEditPoints="1" noAdjustHandles="1" noChangeArrowheads="1" noChangeShapeType="1" noTextEdit="1"/>
-              </p:cNvSpPr>
-              <p:nvPr/>
-            </p:nvSpPr>
-            <p:spPr>
-              <a:xfrm>
-                <a:off x="6327500" y="1383783"/>
-                <a:ext cx="1377237" cy="615553"/>
-              </a:xfrm>
-              <a:prstGeom prst="rect">
-                <a:avLst/>
-              </a:prstGeom>
-              <a:blipFill>
-                <a:blip r:embed="rId4"/>
-                <a:stretch>
-                  <a:fillRect l="-2752" r="-1835" b="-12000"/>
-                </a:stretch>
-              </a:blipFill>
-            </p:spPr>
-            <p:txBody>
-              <a:bodyPr/>
-              <a:lstStyle/>
-              <a:p>
-                <a:r>
-                  <a:rPr lang="nl-NL">
-                    <a:noFill/>
-                  </a:rPr>
-                  <a:t> </a:t>
-                </a:r>
-              </a:p>
-            </p:txBody>
-          </p:sp>
-        </mc:Fallback>
-      </mc:AlternateContent>
-    </p:spTree>
-    <p:extLst>
-      <p:ext uri="{BB962C8B-B14F-4D97-AF65-F5344CB8AC3E}">
-        <p14:creationId xmlns:p14="http://schemas.microsoft.com/office/powerpoint/2010/main" val="3993264698"/>
-      </p:ext>
-    </p:extLst>
-  </p:cSld>
-  <p:clrMapOvr>
-    <a:masterClrMapping/>
-  </p:clrMapOvr>
-</p:sld>
-</file>
-
-<file path=ppt/slides/slide2.xml><?xml version="1.0" encoding="utf-8"?>
-<p:sld xmlns:a="http://schemas.openxmlformats.org/drawingml/2006/main" xmlns:r="http://schemas.openxmlformats.org/officeDocument/2006/relationships" xmlns:p="http://schemas.openxmlformats.org/presentationml/2006/main">
-  <p:cSld>
-    <p:spTree>
-      <p:nvGrpSpPr>
-        <p:cNvPr id="1" name=""/>
-        <p:cNvGrpSpPr/>
-        <p:nvPr/>
-      </p:nvGrpSpPr>
-      <p:grpSpPr>
-        <a:xfrm>
-          <a:off x="0" y="0"/>
-          <a:ext cx="0" cy="0"/>
-          <a:chOff x="0" y="0"/>
-          <a:chExt cx="0" cy="0"/>
-        </a:xfrm>
-      </p:grpSpPr>
-      <p:cxnSp>
-        <p:nvCxnSpPr>
-          <p:cNvPr id="5" name="Rechte verbindingslijn 4">
-            <a:extLst>
-              <a:ext uri="{FF2B5EF4-FFF2-40B4-BE49-F238E27FC236}">
-                <a16:creationId xmlns:a16="http://schemas.microsoft.com/office/drawing/2014/main" id="{A2A95EE2-FE55-A740-5A04-7861A251B306}"/>
-              </a:ext>
-            </a:extLst>
-          </p:cNvPr>
-          <p:cNvCxnSpPr>
-            <a:cxnSpLocks/>
-          </p:cNvCxnSpPr>
-          <p:nvPr/>
-        </p:nvCxnSpPr>
-        <p:spPr>
-          <a:xfrm>
-            <a:off x="2024743" y="2188029"/>
-            <a:ext cx="1749094" cy="0"/>
-          </a:xfrm>
-          <a:prstGeom prst="line">
-            <a:avLst/>
-          </a:prstGeom>
-          <a:ln w="19050">
-            <a:solidFill>
-              <a:schemeClr val="tx1"/>
-            </a:solidFill>
-            <a:prstDash val="sysDot"/>
-          </a:ln>
-        </p:spPr>
-        <p:style>
-          <a:lnRef idx="1">
-            <a:schemeClr val="accent1"/>
-          </a:lnRef>
-          <a:fillRef idx="0">
-            <a:schemeClr val="accent1"/>
-          </a:fillRef>
-          <a:effectRef idx="0">
-            <a:schemeClr val="accent1"/>
-          </a:effectRef>
-          <a:fontRef idx="minor">
-            <a:schemeClr val="tx1"/>
-          </a:fontRef>
-        </p:style>
-      </p:cxnSp>
-      <p:cxnSp>
-        <p:nvCxnSpPr>
-          <p:cNvPr id="6" name="Rechte verbindingslijn 5">
-            <a:extLst>
-              <a:ext uri="{FF2B5EF4-FFF2-40B4-BE49-F238E27FC236}">
-                <a16:creationId xmlns:a16="http://schemas.microsoft.com/office/drawing/2014/main" id="{F7BB93F3-8137-A7DE-B17E-2D701C5D9330}"/>
-              </a:ext>
-            </a:extLst>
-          </p:cNvPr>
-          <p:cNvCxnSpPr>
-            <a:cxnSpLocks/>
-          </p:cNvCxnSpPr>
-          <p:nvPr/>
-        </p:nvCxnSpPr>
-        <p:spPr>
-          <a:xfrm>
-            <a:off x="2024743" y="2544490"/>
-            <a:ext cx="1749094" cy="0"/>
-          </a:xfrm>
-          <a:prstGeom prst="line">
-            <a:avLst/>
-          </a:prstGeom>
-          <a:ln w="19050">
-            <a:solidFill>
-              <a:schemeClr val="tx1"/>
-            </a:solidFill>
-            <a:prstDash val="sysDot"/>
-          </a:ln>
-        </p:spPr>
-        <p:style>
-          <a:lnRef idx="1">
-            <a:schemeClr val="accent1"/>
-          </a:lnRef>
-          <a:fillRef idx="0">
-            <a:schemeClr val="accent1"/>
-          </a:fillRef>
-          <a:effectRef idx="0">
-            <a:schemeClr val="accent1"/>
-          </a:effectRef>
-          <a:fontRef idx="minor">
-            <a:schemeClr val="tx1"/>
-          </a:fontRef>
-        </p:style>
-      </p:cxnSp>
-      <p:cxnSp>
-        <p:nvCxnSpPr>
-          <p:cNvPr id="7" name="Rechte verbindingslijn 6">
-            <a:extLst>
-              <a:ext uri="{FF2B5EF4-FFF2-40B4-BE49-F238E27FC236}">
-                <a16:creationId xmlns:a16="http://schemas.microsoft.com/office/drawing/2014/main" id="{AB33270F-1F5F-CFDC-2F89-19D4E5533EF3}"/>
-              </a:ext>
-            </a:extLst>
-          </p:cNvPr>
-          <p:cNvCxnSpPr>
-            <a:cxnSpLocks/>
-          </p:cNvCxnSpPr>
-          <p:nvPr/>
-        </p:nvCxnSpPr>
-        <p:spPr>
-          <a:xfrm flipV="1">
-            <a:off x="2278251" y="2035572"/>
-            <a:ext cx="468892" cy="335669"/>
-          </a:xfrm>
-          <a:prstGeom prst="line">
-            <a:avLst/>
-          </a:prstGeom>
-          <a:ln w="19050">
-            <a:solidFill>
-              <a:schemeClr val="tx1"/>
-            </a:solidFill>
-            <a:prstDash val="solid"/>
-            <a:headEnd type="oval"/>
-          </a:ln>
-        </p:spPr>
-        <p:style>
-          <a:lnRef idx="1">
-            <a:schemeClr val="accent1"/>
-          </a:lnRef>
-          <a:fillRef idx="0">
-            <a:schemeClr val="accent1"/>
-          </a:fillRef>
-          <a:effectRef idx="0">
-            <a:schemeClr val="accent1"/>
-          </a:effectRef>
-          <a:fontRef idx="minor">
-            <a:schemeClr val="tx1"/>
-          </a:fontRef>
-        </p:style>
-      </p:cxnSp>
-      <p:cxnSp>
-        <p:nvCxnSpPr>
-          <p:cNvPr id="12" name="Rechte verbindingslijn 11">
-            <a:extLst>
-              <a:ext uri="{FF2B5EF4-FFF2-40B4-BE49-F238E27FC236}">
-                <a16:creationId xmlns:a16="http://schemas.microsoft.com/office/drawing/2014/main" id="{8AC44BEA-4869-1C7F-84BF-153DD46DA785}"/>
-              </a:ext>
-            </a:extLst>
-          </p:cNvPr>
-          <p:cNvCxnSpPr>
-            <a:cxnSpLocks/>
-          </p:cNvCxnSpPr>
-          <p:nvPr/>
-        </p:nvCxnSpPr>
-        <p:spPr>
-          <a:xfrm>
-            <a:off x="2747166" y="2043321"/>
-            <a:ext cx="503695" cy="0"/>
-          </a:xfrm>
-          <a:prstGeom prst="line">
-            <a:avLst/>
-          </a:prstGeom>
-          <a:ln w="19050">
-            <a:solidFill>
-              <a:schemeClr val="tx1"/>
-            </a:solidFill>
-            <a:prstDash val="solid"/>
-            <a:headEnd type="oval"/>
-            <a:tailEnd type="oval"/>
-          </a:ln>
-        </p:spPr>
-        <p:style>
-          <a:lnRef idx="1">
-            <a:schemeClr val="accent1"/>
-          </a:lnRef>
-          <a:fillRef idx="0">
-            <a:schemeClr val="accent1"/>
-          </a:fillRef>
-          <a:effectRef idx="0">
-            <a:schemeClr val="accent1"/>
-          </a:effectRef>
-          <a:fontRef idx="minor">
-            <a:schemeClr val="tx1"/>
-          </a:fontRef>
-        </p:style>
-      </p:cxnSp>
-      <p:sp>
-        <p:nvSpPr>
-          <p:cNvPr id="15" name="Tekstvak 14">
-            <a:extLst>
-              <a:ext uri="{FF2B5EF4-FFF2-40B4-BE49-F238E27FC236}">
-                <a16:creationId xmlns:a16="http://schemas.microsoft.com/office/drawing/2014/main" id="{1CFBECAA-2709-3847-9AE4-2EB846F12787}"/>
+      <p:sp>
+        <p:nvSpPr>
+          <p:cNvPr id="22" name="Tekstvak 21">
+            <a:extLst>
+              <a:ext uri="{FF2B5EF4-FFF2-40B4-BE49-F238E27FC236}">
+                <a16:creationId xmlns:a16="http://schemas.microsoft.com/office/drawing/2014/main" id="{A1C651B6-1644-AFEC-A44E-D5F3C9453320}"/>
               </a:ext>
             </a:extLst>
           </p:cNvPr>
@@ -5560,8 +5059,8 @@
         </p:nvSpPr>
         <p:spPr>
           <a:xfrm>
-            <a:off x="1925592" y="3043340"/>
-            <a:ext cx="659155" cy="369332"/>
+            <a:off x="2610233" y="2788088"/>
+            <a:ext cx="301686" cy="369332"/>
           </a:xfrm>
           <a:prstGeom prst="rect">
             <a:avLst/>
@@ -5575,112 +5074,22 @@
           <a:lstStyle/>
           <a:p>
             <a:r>
-              <a:rPr lang="nl-NL" i="1" dirty="0">
-                <a:latin typeface="CMU Serif" panose="02000603000000000000" pitchFamily="2" charset="0"/>
-                <a:ea typeface="CMU Serif" panose="02000603000000000000" pitchFamily="2" charset="0"/>
-                <a:cs typeface="CMU Serif" panose="02000603000000000000" pitchFamily="2" charset="0"/>
+              <a:rPr lang="nl-NL" dirty="0">
+                <a:latin typeface="CMU Serif Roman" panose="02000603000000000000" pitchFamily="2" charset="0"/>
+                <a:ea typeface="CMU Serif Roman" panose="02000603000000000000" pitchFamily="2" charset="0"/>
+                <a:cs typeface="CMU Serif Roman" panose="02000603000000000000" pitchFamily="2" charset="0"/>
               </a:rPr>
-              <a:t>k - d</a:t>
-            </a:r>
-          </a:p>
-        </p:txBody>
-      </p:sp>
-      <p:cxnSp>
-        <p:nvCxnSpPr>
-          <p:cNvPr id="28" name="Rechte verbindingslijn 27">
-            <a:extLst>
-              <a:ext uri="{FF2B5EF4-FFF2-40B4-BE49-F238E27FC236}">
-                <a16:creationId xmlns:a16="http://schemas.microsoft.com/office/drawing/2014/main" id="{09A818C1-31C8-498D-D447-9545B9C6F322}"/>
-              </a:ext>
-            </a:extLst>
-          </p:cNvPr>
-          <p:cNvCxnSpPr>
-            <a:cxnSpLocks/>
-          </p:cNvCxnSpPr>
-          <p:nvPr/>
-        </p:nvCxnSpPr>
-        <p:spPr>
-          <a:xfrm flipV="1">
-            <a:off x="2024743" y="1928156"/>
-            <a:ext cx="0" cy="846041"/>
-          </a:xfrm>
-          <a:prstGeom prst="line">
-            <a:avLst/>
-          </a:prstGeom>
-          <a:ln w="19050">
-            <a:solidFill>
-              <a:schemeClr val="tx1"/>
-            </a:solidFill>
-            <a:prstDash val="solid"/>
-            <a:headEnd type="none"/>
-          </a:ln>
-        </p:spPr>
-        <p:style>
-          <a:lnRef idx="1">
-            <a:schemeClr val="accent1"/>
-          </a:lnRef>
-          <a:fillRef idx="0">
-            <a:schemeClr val="accent1"/>
-          </a:fillRef>
-          <a:effectRef idx="0">
-            <a:schemeClr val="accent1"/>
-          </a:effectRef>
-          <a:fontRef idx="minor">
-            <a:schemeClr val="tx1"/>
-          </a:fontRef>
-        </p:style>
-      </p:cxnSp>
-      <p:cxnSp>
-        <p:nvCxnSpPr>
-          <p:cNvPr id="33" name="Rechte verbindingslijn 32">
-            <a:extLst>
-              <a:ext uri="{FF2B5EF4-FFF2-40B4-BE49-F238E27FC236}">
-                <a16:creationId xmlns:a16="http://schemas.microsoft.com/office/drawing/2014/main" id="{155B414F-2E27-DFE3-DC00-3D6C9306DD34}"/>
-              </a:ext>
-            </a:extLst>
-          </p:cNvPr>
-          <p:cNvCxnSpPr>
-            <a:cxnSpLocks/>
-          </p:cNvCxnSpPr>
-          <p:nvPr/>
-        </p:nvCxnSpPr>
-        <p:spPr>
-          <a:xfrm flipH="1">
-            <a:off x="2024743" y="2774197"/>
-            <a:ext cx="1749094" cy="0"/>
-          </a:xfrm>
-          <a:prstGeom prst="line">
-            <a:avLst/>
-          </a:prstGeom>
-          <a:ln w="19050">
-            <a:solidFill>
-              <a:schemeClr val="tx1"/>
-            </a:solidFill>
-            <a:prstDash val="solid"/>
-            <a:headEnd type="none"/>
-          </a:ln>
-        </p:spPr>
-        <p:style>
-          <a:lnRef idx="1">
-            <a:schemeClr val="accent1"/>
-          </a:lnRef>
-          <a:fillRef idx="0">
-            <a:schemeClr val="accent1"/>
-          </a:fillRef>
-          <a:effectRef idx="0">
-            <a:schemeClr val="accent1"/>
-          </a:effectRef>
-          <a:fontRef idx="minor">
-            <a:schemeClr val="tx1"/>
-          </a:fontRef>
-        </p:style>
-      </p:cxnSp>
-      <p:sp>
-        <p:nvSpPr>
-          <p:cNvPr id="40" name="Tekstvak 39">
-            <a:extLst>
-              <a:ext uri="{FF2B5EF4-FFF2-40B4-BE49-F238E27FC236}">
-                <a16:creationId xmlns:a16="http://schemas.microsoft.com/office/drawing/2014/main" id="{0A47C239-8559-4E9D-F1F5-F1A969A19539}"/>
+              <a:t>1</a:t>
+            </a:r>
+          </a:p>
+        </p:txBody>
+      </p:sp>
+      <p:sp>
+        <p:nvSpPr>
+          <p:cNvPr id="23" name="Tekstvak 22">
+            <a:extLst>
+              <a:ext uri="{FF2B5EF4-FFF2-40B4-BE49-F238E27FC236}">
+                <a16:creationId xmlns:a16="http://schemas.microsoft.com/office/drawing/2014/main" id="{0B8A4DB0-2BC1-0537-699F-3067E030F1EE}"/>
               </a:ext>
             </a:extLst>
           </p:cNvPr>
@@ -5689,8 +5098,8 @@
         </p:nvSpPr>
         <p:spPr>
           <a:xfrm>
-            <a:off x="3138983" y="3052650"/>
-            <a:ext cx="365806" cy="369332"/>
+            <a:off x="3126506" y="2788088"/>
+            <a:ext cx="301686" cy="369332"/>
           </a:xfrm>
           <a:prstGeom prst="rect">
             <a:avLst/>
@@ -5704,165 +5113,22 @@
           <a:lstStyle/>
           <a:p>
             <a:r>
-              <a:rPr lang="nl-NL" i="1" dirty="0">
-                <a:latin typeface="CMU Serif" panose="02000603000000000000" pitchFamily="2" charset="0"/>
-                <a:ea typeface="CMU Serif" panose="02000603000000000000" pitchFamily="2" charset="0"/>
-                <a:cs typeface="CMU Serif" panose="02000603000000000000" pitchFamily="2" charset="0"/>
+              <a:rPr lang="nl-NL" dirty="0">
+                <a:latin typeface="CMU Serif Roman" panose="02000603000000000000" pitchFamily="2" charset="0"/>
+                <a:ea typeface="CMU Serif Roman" panose="02000603000000000000" pitchFamily="2" charset="0"/>
+                <a:cs typeface="CMU Serif Roman" panose="02000603000000000000" pitchFamily="2" charset="0"/>
               </a:rPr>
-              <a:t>k</a:t>
-            </a:r>
-            <a:r>
-              <a:rPr lang="nl-NL" sz="1400" i="1" dirty="0">
-                <a:latin typeface="CMU Serif" panose="02000603000000000000" pitchFamily="2" charset="0"/>
-                <a:ea typeface="CMU Serif" panose="02000603000000000000" pitchFamily="2" charset="0"/>
-                <a:cs typeface="CMU Serif" panose="02000603000000000000" pitchFamily="2" charset="0"/>
-              </a:rPr>
-              <a:t> </a:t>
-            </a:r>
-          </a:p>
-        </p:txBody>
-      </p:sp>
-      <p:cxnSp>
-        <p:nvCxnSpPr>
-          <p:cNvPr id="46" name="Rechte verbindingslijn 45">
-            <a:extLst>
-              <a:ext uri="{FF2B5EF4-FFF2-40B4-BE49-F238E27FC236}">
-                <a16:creationId xmlns:a16="http://schemas.microsoft.com/office/drawing/2014/main" id="{BA0633FE-336B-30AB-CA81-5ECC01BDF74A}"/>
-              </a:ext>
-            </a:extLst>
-          </p:cNvPr>
-          <p:cNvCxnSpPr>
-            <a:cxnSpLocks/>
-          </p:cNvCxnSpPr>
-          <p:nvPr/>
-        </p:nvCxnSpPr>
-        <p:spPr>
-          <a:xfrm flipV="1">
-            <a:off x="2278251" y="2734759"/>
-            <a:ext cx="0" cy="78875"/>
-          </a:xfrm>
-          <a:prstGeom prst="line">
-            <a:avLst/>
-          </a:prstGeom>
-          <a:ln w="19050">
-            <a:solidFill>
-              <a:schemeClr val="tx1"/>
-            </a:solidFill>
-            <a:prstDash val="solid"/>
-            <a:headEnd type="none"/>
-          </a:ln>
-        </p:spPr>
-        <p:style>
-          <a:lnRef idx="1">
-            <a:schemeClr val="accent1"/>
-          </a:lnRef>
-          <a:fillRef idx="0">
-            <a:schemeClr val="accent1"/>
-          </a:fillRef>
-          <a:effectRef idx="0">
-            <a:schemeClr val="accent1"/>
-          </a:effectRef>
-          <a:fontRef idx="minor">
-            <a:schemeClr val="tx1"/>
-          </a:fontRef>
-        </p:style>
-      </p:cxnSp>
-      <p:cxnSp>
-        <p:nvCxnSpPr>
-          <p:cNvPr id="48" name="Rechte verbindingslijn 47">
-            <a:extLst>
-              <a:ext uri="{FF2B5EF4-FFF2-40B4-BE49-F238E27FC236}">
-                <a16:creationId xmlns:a16="http://schemas.microsoft.com/office/drawing/2014/main" id="{B05E35AB-7DC1-61BD-7520-680FE5159885}"/>
-              </a:ext>
-            </a:extLst>
-          </p:cNvPr>
-          <p:cNvCxnSpPr>
-            <a:cxnSpLocks/>
-          </p:cNvCxnSpPr>
-          <p:nvPr/>
-        </p:nvCxnSpPr>
-        <p:spPr>
-          <a:xfrm flipV="1">
-            <a:off x="2744078" y="2740510"/>
-            <a:ext cx="0" cy="78875"/>
-          </a:xfrm>
-          <a:prstGeom prst="line">
-            <a:avLst/>
-          </a:prstGeom>
-          <a:ln w="19050">
-            <a:solidFill>
-              <a:schemeClr val="tx1"/>
-            </a:solidFill>
-            <a:prstDash val="solid"/>
-            <a:headEnd type="none"/>
-          </a:ln>
-        </p:spPr>
-        <p:style>
-          <a:lnRef idx="1">
-            <a:schemeClr val="accent1"/>
-          </a:lnRef>
-          <a:fillRef idx="0">
-            <a:schemeClr val="accent1"/>
-          </a:fillRef>
-          <a:effectRef idx="0">
-            <a:schemeClr val="accent1"/>
-          </a:effectRef>
-          <a:fontRef idx="minor">
-            <a:schemeClr val="tx1"/>
-          </a:fontRef>
-        </p:style>
-      </p:cxnSp>
-      <p:cxnSp>
-        <p:nvCxnSpPr>
-          <p:cNvPr id="50" name="Rechte verbindingslijn 49">
-            <a:extLst>
-              <a:ext uri="{FF2B5EF4-FFF2-40B4-BE49-F238E27FC236}">
-                <a16:creationId xmlns:a16="http://schemas.microsoft.com/office/drawing/2014/main" id="{CF55998E-2B76-941D-CC34-548BD7FF9F25}"/>
-              </a:ext>
-            </a:extLst>
-          </p:cNvPr>
-          <p:cNvCxnSpPr>
-            <a:cxnSpLocks/>
-          </p:cNvCxnSpPr>
-          <p:nvPr/>
-        </p:nvCxnSpPr>
-        <p:spPr>
-          <a:xfrm flipV="1">
-            <a:off x="3261663" y="2740510"/>
-            <a:ext cx="0" cy="78875"/>
-          </a:xfrm>
-          <a:prstGeom prst="line">
-            <a:avLst/>
-          </a:prstGeom>
-          <a:ln w="19050">
-            <a:solidFill>
-              <a:schemeClr val="tx1"/>
-            </a:solidFill>
-            <a:prstDash val="solid"/>
-            <a:headEnd type="none"/>
-          </a:ln>
-        </p:spPr>
-        <p:style>
-          <a:lnRef idx="1">
-            <a:schemeClr val="accent1"/>
-          </a:lnRef>
-          <a:fillRef idx="0">
-            <a:schemeClr val="accent1"/>
-          </a:fillRef>
-          <a:effectRef idx="0">
-            <a:schemeClr val="accent1"/>
-          </a:effectRef>
-          <a:fontRef idx="minor">
-            <a:schemeClr val="tx1"/>
-          </a:fontRef>
-        </p:style>
-      </p:cxnSp>
-      <p:sp>
-        <p:nvSpPr>
-          <p:cNvPr id="51" name="Tekstvak 50">
-            <a:extLst>
-              <a:ext uri="{FF2B5EF4-FFF2-40B4-BE49-F238E27FC236}">
-                <a16:creationId xmlns:a16="http://schemas.microsoft.com/office/drawing/2014/main" id="{FFCD715A-E74A-6975-5075-4BDF98FABE09}"/>
+              <a:t>2</a:t>
+            </a:r>
+          </a:p>
+        </p:txBody>
+      </p:sp>
+      <p:sp>
+        <p:nvSpPr>
+          <p:cNvPr id="24" name="Tekstvak 23">
+            <a:extLst>
+              <a:ext uri="{FF2B5EF4-FFF2-40B4-BE49-F238E27FC236}">
+                <a16:creationId xmlns:a16="http://schemas.microsoft.com/office/drawing/2014/main" id="{6918DCF9-04DF-8505-C95E-76DF577FE0FA}"/>
               </a:ext>
             </a:extLst>
           </p:cNvPr>
@@ -5871,8 +5137,8 @@
         </p:nvSpPr>
         <p:spPr>
           <a:xfrm>
-            <a:off x="1674082" y="1909576"/>
-            <a:ext cx="396262" cy="461665"/>
+            <a:off x="4173655" y="2788088"/>
+            <a:ext cx="301686" cy="369332"/>
           </a:xfrm>
           <a:prstGeom prst="rect">
             <a:avLst/>
@@ -5886,23 +5152,22 @@
           <a:lstStyle/>
           <a:p>
             <a:r>
-              <a:rPr lang="nl-NL" sz="2400" dirty="0"/>
-              <a:t>r</a:t>
-            </a:r>
-            <a:r>
-              <a:rPr lang="nl-NL" sz="2400" baseline="-25000" dirty="0"/>
-              <a:t>1</a:t>
-            </a:r>
-            <a:endParaRPr lang="nl-NL" sz="1600" baseline="-25000" dirty="0"/>
-          </a:p>
-        </p:txBody>
-      </p:sp>
-      <p:sp>
-        <p:nvSpPr>
-          <p:cNvPr id="52" name="Tekstvak 51">
-            <a:extLst>
-              <a:ext uri="{FF2B5EF4-FFF2-40B4-BE49-F238E27FC236}">
-                <a16:creationId xmlns:a16="http://schemas.microsoft.com/office/drawing/2014/main" id="{D36A2B6A-8595-9273-264E-EB19B65E2347}"/>
+              <a:rPr lang="nl-NL" dirty="0">
+                <a:latin typeface="CMU Serif Roman" panose="02000603000000000000" pitchFamily="2" charset="0"/>
+                <a:ea typeface="CMU Serif Roman" panose="02000603000000000000" pitchFamily="2" charset="0"/>
+                <a:cs typeface="CMU Serif Roman" panose="02000603000000000000" pitchFamily="2" charset="0"/>
+              </a:rPr>
+              <a:t>0</a:t>
+            </a:r>
+          </a:p>
+        </p:txBody>
+      </p:sp>
+      <p:sp>
+        <p:nvSpPr>
+          <p:cNvPr id="25" name="Tekstvak 24">
+            <a:extLst>
+              <a:ext uri="{FF2B5EF4-FFF2-40B4-BE49-F238E27FC236}">
+                <a16:creationId xmlns:a16="http://schemas.microsoft.com/office/drawing/2014/main" id="{73ACB221-9439-839B-1941-DC5C5EA10D0A}"/>
               </a:ext>
             </a:extLst>
           </p:cNvPr>
@@ -5911,8 +5176,8 @@
         </p:nvSpPr>
         <p:spPr>
           <a:xfrm>
-            <a:off x="1672273" y="2274313"/>
-            <a:ext cx="396262" cy="461665"/>
+            <a:off x="4645861" y="2788088"/>
+            <a:ext cx="301686" cy="369332"/>
           </a:xfrm>
           <a:prstGeom prst="rect">
             <a:avLst/>
@@ -5926,201 +5191,22 @@
           <a:lstStyle/>
           <a:p>
             <a:r>
-              <a:rPr lang="nl-NL" sz="2400" dirty="0"/>
-              <a:t>r</a:t>
-            </a:r>
-            <a:r>
-              <a:rPr lang="nl-NL" sz="2400" baseline="-25000" dirty="0"/>
-              <a:t>0</a:t>
-            </a:r>
-          </a:p>
-        </p:txBody>
-      </p:sp>
-      <p:cxnSp>
-        <p:nvCxnSpPr>
-          <p:cNvPr id="53" name="Rechte verbindingslijn 52">
-            <a:extLst>
-              <a:ext uri="{FF2B5EF4-FFF2-40B4-BE49-F238E27FC236}">
-                <a16:creationId xmlns:a16="http://schemas.microsoft.com/office/drawing/2014/main" id="{0F5F9948-BE33-CA94-DAAC-F61B6C9F8D92}"/>
-              </a:ext>
-            </a:extLst>
-          </p:cNvPr>
-          <p:cNvCxnSpPr>
-            <a:cxnSpLocks/>
-          </p:cNvCxnSpPr>
-          <p:nvPr/>
-        </p:nvCxnSpPr>
-        <p:spPr>
-          <a:xfrm>
-            <a:off x="4056387" y="2188029"/>
-            <a:ext cx="1749094" cy="0"/>
-          </a:xfrm>
-          <a:prstGeom prst="line">
-            <a:avLst/>
-          </a:prstGeom>
-          <a:ln w="19050">
-            <a:solidFill>
-              <a:schemeClr val="tx1"/>
-            </a:solidFill>
-            <a:prstDash val="sysDot"/>
-          </a:ln>
-        </p:spPr>
-        <p:style>
-          <a:lnRef idx="1">
-            <a:schemeClr val="accent1"/>
-          </a:lnRef>
-          <a:fillRef idx="0">
-            <a:schemeClr val="accent1"/>
-          </a:fillRef>
-          <a:effectRef idx="0">
-            <a:schemeClr val="accent1"/>
-          </a:effectRef>
-          <a:fontRef idx="minor">
-            <a:schemeClr val="tx1"/>
-          </a:fontRef>
-        </p:style>
-      </p:cxnSp>
-      <p:cxnSp>
-        <p:nvCxnSpPr>
-          <p:cNvPr id="54" name="Rechte verbindingslijn 53">
-            <a:extLst>
-              <a:ext uri="{FF2B5EF4-FFF2-40B4-BE49-F238E27FC236}">
-                <a16:creationId xmlns:a16="http://schemas.microsoft.com/office/drawing/2014/main" id="{17FD377C-988D-5644-837C-B5AE4974AD4C}"/>
-              </a:ext>
-            </a:extLst>
-          </p:cNvPr>
-          <p:cNvCxnSpPr>
-            <a:cxnSpLocks/>
-          </p:cNvCxnSpPr>
-          <p:nvPr/>
-        </p:nvCxnSpPr>
-        <p:spPr>
-          <a:xfrm>
-            <a:off x="4056387" y="2544490"/>
-            <a:ext cx="1749094" cy="0"/>
-          </a:xfrm>
-          <a:prstGeom prst="line">
-            <a:avLst/>
-          </a:prstGeom>
-          <a:ln w="19050">
-            <a:solidFill>
-              <a:schemeClr val="tx1"/>
-            </a:solidFill>
-            <a:prstDash val="sysDot"/>
-          </a:ln>
-        </p:spPr>
-        <p:style>
-          <a:lnRef idx="1">
-            <a:schemeClr val="accent1"/>
-          </a:lnRef>
-          <a:fillRef idx="0">
-            <a:schemeClr val="accent1"/>
-          </a:fillRef>
-          <a:effectRef idx="0">
-            <a:schemeClr val="accent1"/>
-          </a:effectRef>
-          <a:fontRef idx="minor">
-            <a:schemeClr val="tx1"/>
-          </a:fontRef>
-        </p:style>
-      </p:cxnSp>
-      <p:cxnSp>
-        <p:nvCxnSpPr>
-          <p:cNvPr id="55" name="Rechte verbindingslijn 54">
-            <a:extLst>
-              <a:ext uri="{FF2B5EF4-FFF2-40B4-BE49-F238E27FC236}">
-                <a16:creationId xmlns:a16="http://schemas.microsoft.com/office/drawing/2014/main" id="{8BA1CDF0-A7AA-C219-211F-EA89520C2040}"/>
-              </a:ext>
-            </a:extLst>
-          </p:cNvPr>
-          <p:cNvCxnSpPr>
-            <a:cxnSpLocks/>
-          </p:cNvCxnSpPr>
-          <p:nvPr/>
-        </p:nvCxnSpPr>
-        <p:spPr>
-          <a:xfrm>
-            <a:off x="4285393" y="2043321"/>
-            <a:ext cx="472714" cy="319064"/>
-          </a:xfrm>
-          <a:prstGeom prst="line">
-            <a:avLst/>
-          </a:prstGeom>
-          <a:ln w="19050">
-            <a:solidFill>
-              <a:schemeClr val="tx1"/>
-            </a:solidFill>
-            <a:prstDash val="solid"/>
-            <a:headEnd type="oval"/>
-          </a:ln>
-        </p:spPr>
-        <p:style>
-          <a:lnRef idx="1">
-            <a:schemeClr val="accent1"/>
-          </a:lnRef>
-          <a:fillRef idx="0">
-            <a:schemeClr val="accent1"/>
-          </a:fillRef>
-          <a:effectRef idx="0">
-            <a:schemeClr val="accent1"/>
-          </a:effectRef>
-          <a:fontRef idx="minor">
-            <a:schemeClr val="tx1"/>
-          </a:fontRef>
-        </p:style>
-      </p:cxnSp>
-      <p:cxnSp>
-        <p:nvCxnSpPr>
-          <p:cNvPr id="56" name="Rechte verbindingslijn 55">
-            <a:extLst>
-              <a:ext uri="{FF2B5EF4-FFF2-40B4-BE49-F238E27FC236}">
-                <a16:creationId xmlns:a16="http://schemas.microsoft.com/office/drawing/2014/main" id="{D20BB75F-EB87-ADBE-B922-1A0BC025D7AB}"/>
-              </a:ext>
-            </a:extLst>
-          </p:cNvPr>
-          <p:cNvCxnSpPr>
-            <a:cxnSpLocks/>
-          </p:cNvCxnSpPr>
-          <p:nvPr/>
-        </p:nvCxnSpPr>
-        <p:spPr>
-          <a:xfrm>
-            <a:off x="4775722" y="2371241"/>
-            <a:ext cx="520728" cy="0"/>
-          </a:xfrm>
-          <a:prstGeom prst="line">
-            <a:avLst/>
-          </a:prstGeom>
-          <a:ln w="19050">
-            <a:solidFill>
-              <a:schemeClr val="tx1"/>
-            </a:solidFill>
-            <a:prstDash val="solid"/>
-            <a:headEnd type="oval"/>
-            <a:tailEnd type="oval"/>
-          </a:ln>
-        </p:spPr>
-        <p:style>
-          <a:lnRef idx="1">
-            <a:schemeClr val="accent1"/>
-          </a:lnRef>
-          <a:fillRef idx="0">
-            <a:schemeClr val="accent1"/>
-          </a:fillRef>
-          <a:effectRef idx="0">
-            <a:schemeClr val="accent1"/>
-          </a:effectRef>
-          <a:fontRef idx="minor">
-            <a:schemeClr val="tx1"/>
-          </a:fontRef>
-        </p:style>
-      </p:cxnSp>
-      <p:sp>
-        <p:nvSpPr>
-          <p:cNvPr id="57" name="Tekstvak 56">
-            <a:extLst>
-              <a:ext uri="{FF2B5EF4-FFF2-40B4-BE49-F238E27FC236}">
-                <a16:creationId xmlns:a16="http://schemas.microsoft.com/office/drawing/2014/main" id="{101C9C50-2BA8-D934-C95B-D56B9951B325}"/>
+              <a:rPr lang="nl-NL" dirty="0">
+                <a:latin typeface="CMU Serif Roman" panose="02000603000000000000" pitchFamily="2" charset="0"/>
+                <a:ea typeface="CMU Serif Roman" panose="02000603000000000000" pitchFamily="2" charset="0"/>
+                <a:cs typeface="CMU Serif Roman" panose="02000603000000000000" pitchFamily="2" charset="0"/>
+              </a:rPr>
+              <a:t>1</a:t>
+            </a:r>
+          </a:p>
+        </p:txBody>
+      </p:sp>
+      <p:sp>
+        <p:nvSpPr>
+          <p:cNvPr id="26" name="Tekstvak 25">
+            <a:extLst>
+              <a:ext uri="{FF2B5EF4-FFF2-40B4-BE49-F238E27FC236}">
+                <a16:creationId xmlns:a16="http://schemas.microsoft.com/office/drawing/2014/main" id="{F72AA9A4-517C-810D-1B41-807737329D62}"/>
               </a:ext>
             </a:extLst>
           </p:cNvPr>
@@ -6129,8 +5215,8 @@
         </p:nvSpPr>
         <p:spPr>
           <a:xfrm>
-            <a:off x="4447620" y="3052650"/>
-            <a:ext cx="665567" cy="369332"/>
+            <a:off x="5162134" y="2788088"/>
+            <a:ext cx="301686" cy="369332"/>
           </a:xfrm>
           <a:prstGeom prst="rect">
             <a:avLst/>
@@ -6144,112 +5230,22 @@
           <a:lstStyle/>
           <a:p>
             <a:r>
-              <a:rPr lang="nl-NL" i="1" dirty="0">
-                <a:latin typeface="CMU Serif" panose="02000603000000000000" pitchFamily="2" charset="0"/>
-                <a:ea typeface="CMU Serif" panose="02000603000000000000" pitchFamily="2" charset="0"/>
-                <a:cs typeface="CMU Serif" panose="02000603000000000000" pitchFamily="2" charset="0"/>
+              <a:rPr lang="nl-NL" dirty="0">
+                <a:latin typeface="CMU Serif Roman" panose="02000603000000000000" pitchFamily="2" charset="0"/>
+                <a:ea typeface="CMU Serif Roman" panose="02000603000000000000" pitchFamily="2" charset="0"/>
+                <a:cs typeface="CMU Serif Roman" panose="02000603000000000000" pitchFamily="2" charset="0"/>
               </a:rPr>
-              <a:t>k - d</a:t>
-            </a:r>
-          </a:p>
-        </p:txBody>
-      </p:sp>
-      <p:cxnSp>
-        <p:nvCxnSpPr>
-          <p:cNvPr id="58" name="Rechte verbindingslijn 57">
-            <a:extLst>
-              <a:ext uri="{FF2B5EF4-FFF2-40B4-BE49-F238E27FC236}">
-                <a16:creationId xmlns:a16="http://schemas.microsoft.com/office/drawing/2014/main" id="{9AA96C03-8F46-360F-76C0-FF4622FFB81E}"/>
-              </a:ext>
-            </a:extLst>
-          </p:cNvPr>
-          <p:cNvCxnSpPr>
-            <a:cxnSpLocks/>
-          </p:cNvCxnSpPr>
-          <p:nvPr/>
-        </p:nvCxnSpPr>
-        <p:spPr>
-          <a:xfrm flipV="1">
-            <a:off x="4056387" y="1928156"/>
-            <a:ext cx="0" cy="846041"/>
-          </a:xfrm>
-          <a:prstGeom prst="line">
-            <a:avLst/>
-          </a:prstGeom>
-          <a:ln w="19050">
-            <a:solidFill>
-              <a:schemeClr val="tx1"/>
-            </a:solidFill>
-            <a:prstDash val="solid"/>
-            <a:headEnd type="none"/>
-          </a:ln>
-        </p:spPr>
-        <p:style>
-          <a:lnRef idx="1">
-            <a:schemeClr val="accent1"/>
-          </a:lnRef>
-          <a:fillRef idx="0">
-            <a:schemeClr val="accent1"/>
-          </a:fillRef>
-          <a:effectRef idx="0">
-            <a:schemeClr val="accent1"/>
-          </a:effectRef>
-          <a:fontRef idx="minor">
-            <a:schemeClr val="tx1"/>
-          </a:fontRef>
-        </p:style>
-      </p:cxnSp>
-      <p:cxnSp>
-        <p:nvCxnSpPr>
-          <p:cNvPr id="59" name="Rechte verbindingslijn 58">
-            <a:extLst>
-              <a:ext uri="{FF2B5EF4-FFF2-40B4-BE49-F238E27FC236}">
-                <a16:creationId xmlns:a16="http://schemas.microsoft.com/office/drawing/2014/main" id="{871700B1-283D-E9EF-963A-71AD25F639C7}"/>
-              </a:ext>
-            </a:extLst>
-          </p:cNvPr>
-          <p:cNvCxnSpPr>
-            <a:cxnSpLocks/>
-          </p:cNvCxnSpPr>
-          <p:nvPr/>
-        </p:nvCxnSpPr>
-        <p:spPr>
-          <a:xfrm flipH="1">
-            <a:off x="4056387" y="2774197"/>
-            <a:ext cx="1749094" cy="0"/>
-          </a:xfrm>
-          <a:prstGeom prst="line">
-            <a:avLst/>
-          </a:prstGeom>
-          <a:ln w="19050">
-            <a:solidFill>
-              <a:schemeClr val="tx1"/>
-            </a:solidFill>
-            <a:prstDash val="solid"/>
-            <a:headEnd type="none"/>
-          </a:ln>
-        </p:spPr>
-        <p:style>
-          <a:lnRef idx="1">
-            <a:schemeClr val="accent1"/>
-          </a:lnRef>
-          <a:fillRef idx="0">
-            <a:schemeClr val="accent1"/>
-          </a:fillRef>
-          <a:effectRef idx="0">
-            <a:schemeClr val="accent1"/>
-          </a:effectRef>
-          <a:fontRef idx="minor">
-            <a:schemeClr val="tx1"/>
-          </a:fontRef>
-        </p:style>
-      </p:cxnSp>
-      <p:sp>
-        <p:nvSpPr>
-          <p:cNvPr id="60" name="Tekstvak 59">
-            <a:extLst>
-              <a:ext uri="{FF2B5EF4-FFF2-40B4-BE49-F238E27FC236}">
-                <a16:creationId xmlns:a16="http://schemas.microsoft.com/office/drawing/2014/main" id="{BD82655B-E60D-B53C-DC01-9EE26C9E679A}"/>
+              <a:t>2</a:t>
+            </a:r>
+          </a:p>
+        </p:txBody>
+      </p:sp>
+      <p:sp>
+        <p:nvSpPr>
+          <p:cNvPr id="27" name="Tekstvak 26">
+            <a:extLst>
+              <a:ext uri="{FF2B5EF4-FFF2-40B4-BE49-F238E27FC236}">
+                <a16:creationId xmlns:a16="http://schemas.microsoft.com/office/drawing/2014/main" id="{5D14AF00-64B0-DEAA-9AE7-D5407C0F53DC}"/>
               </a:ext>
             </a:extLst>
           </p:cNvPr>
@@ -6258,8 +5254,8 @@
         </p:nvSpPr>
         <p:spPr>
           <a:xfrm>
-            <a:off x="5168546" y="3052650"/>
-            <a:ext cx="290464" cy="369332"/>
+            <a:off x="6241941" y="2788088"/>
+            <a:ext cx="301686" cy="369332"/>
           </a:xfrm>
           <a:prstGeom prst="rect">
             <a:avLst/>
@@ -6273,157 +5269,22 @@
           <a:lstStyle/>
           <a:p>
             <a:r>
-              <a:rPr lang="nl-NL" i="1" dirty="0">
-                <a:latin typeface="CMU Serif" panose="02000603000000000000" pitchFamily="2" charset="0"/>
-                <a:ea typeface="CMU Serif" panose="02000603000000000000" pitchFamily="2" charset="0"/>
-                <a:cs typeface="CMU Serif" panose="02000603000000000000" pitchFamily="2" charset="0"/>
+              <a:rPr lang="nl-NL" dirty="0">
+                <a:latin typeface="CMU Serif Roman" panose="02000603000000000000" pitchFamily="2" charset="0"/>
+                <a:ea typeface="CMU Serif Roman" panose="02000603000000000000" pitchFamily="2" charset="0"/>
+                <a:cs typeface="CMU Serif Roman" panose="02000603000000000000" pitchFamily="2" charset="0"/>
               </a:rPr>
-              <a:t>k</a:t>
-            </a:r>
-          </a:p>
-        </p:txBody>
-      </p:sp>
-      <p:cxnSp>
-        <p:nvCxnSpPr>
-          <p:cNvPr id="61" name="Rechte verbindingslijn 60">
-            <a:extLst>
-              <a:ext uri="{FF2B5EF4-FFF2-40B4-BE49-F238E27FC236}">
-                <a16:creationId xmlns:a16="http://schemas.microsoft.com/office/drawing/2014/main" id="{33CB664B-3A83-B148-93CA-CBF9186F581E}"/>
-              </a:ext>
-            </a:extLst>
-          </p:cNvPr>
-          <p:cNvCxnSpPr>
-            <a:cxnSpLocks/>
-          </p:cNvCxnSpPr>
-          <p:nvPr/>
-        </p:nvCxnSpPr>
-        <p:spPr>
-          <a:xfrm flipV="1">
-            <a:off x="4309895" y="2734759"/>
-            <a:ext cx="0" cy="78875"/>
-          </a:xfrm>
-          <a:prstGeom prst="line">
-            <a:avLst/>
-          </a:prstGeom>
-          <a:ln w="19050">
-            <a:solidFill>
-              <a:schemeClr val="tx1"/>
-            </a:solidFill>
-            <a:prstDash val="solid"/>
-            <a:headEnd type="none"/>
-          </a:ln>
-        </p:spPr>
-        <p:style>
-          <a:lnRef idx="1">
-            <a:schemeClr val="accent1"/>
-          </a:lnRef>
-          <a:fillRef idx="0">
-            <a:schemeClr val="accent1"/>
-          </a:fillRef>
-          <a:effectRef idx="0">
-            <a:schemeClr val="accent1"/>
-          </a:effectRef>
-          <a:fontRef idx="minor">
-            <a:schemeClr val="tx1"/>
-          </a:fontRef>
-        </p:style>
-      </p:cxnSp>
-      <p:cxnSp>
-        <p:nvCxnSpPr>
-          <p:cNvPr id="62" name="Rechte verbindingslijn 61">
-            <a:extLst>
-              <a:ext uri="{FF2B5EF4-FFF2-40B4-BE49-F238E27FC236}">
-                <a16:creationId xmlns:a16="http://schemas.microsoft.com/office/drawing/2014/main" id="{8588DC2C-A887-82D3-1DDD-4A51D7D5855F}"/>
-              </a:ext>
-            </a:extLst>
-          </p:cNvPr>
-          <p:cNvCxnSpPr>
-            <a:cxnSpLocks/>
-          </p:cNvCxnSpPr>
-          <p:nvPr/>
-        </p:nvCxnSpPr>
-        <p:spPr>
-          <a:xfrm flipV="1">
-            <a:off x="4775722" y="2740510"/>
-            <a:ext cx="0" cy="78875"/>
-          </a:xfrm>
-          <a:prstGeom prst="line">
-            <a:avLst/>
-          </a:prstGeom>
-          <a:ln w="19050">
-            <a:solidFill>
-              <a:schemeClr val="tx1"/>
-            </a:solidFill>
-            <a:prstDash val="solid"/>
-            <a:headEnd type="none"/>
-          </a:ln>
-        </p:spPr>
-        <p:style>
-          <a:lnRef idx="1">
-            <a:schemeClr val="accent1"/>
-          </a:lnRef>
-          <a:fillRef idx="0">
-            <a:schemeClr val="accent1"/>
-          </a:fillRef>
-          <a:effectRef idx="0">
-            <a:schemeClr val="accent1"/>
-          </a:effectRef>
-          <a:fontRef idx="minor">
-            <a:schemeClr val="tx1"/>
-          </a:fontRef>
-        </p:style>
-      </p:cxnSp>
-      <p:cxnSp>
-        <p:nvCxnSpPr>
-          <p:cNvPr id="63" name="Rechte verbindingslijn 62">
-            <a:extLst>
-              <a:ext uri="{FF2B5EF4-FFF2-40B4-BE49-F238E27FC236}">
-                <a16:creationId xmlns:a16="http://schemas.microsoft.com/office/drawing/2014/main" id="{8EFFB6BF-0E8C-F532-EBA1-1DDA7F115010}"/>
-              </a:ext>
-            </a:extLst>
-          </p:cNvPr>
-          <p:cNvCxnSpPr>
-            <a:cxnSpLocks/>
-          </p:cNvCxnSpPr>
-          <p:nvPr/>
-        </p:nvCxnSpPr>
-        <p:spPr>
-          <a:xfrm flipV="1">
-            <a:off x="5293307" y="2740510"/>
-            <a:ext cx="0" cy="78875"/>
-          </a:xfrm>
-          <a:prstGeom prst="line">
-            <a:avLst/>
-          </a:prstGeom>
-          <a:ln w="19050">
-            <a:solidFill>
-              <a:schemeClr val="tx1"/>
-            </a:solidFill>
-            <a:prstDash val="solid"/>
-            <a:headEnd type="none"/>
-          </a:ln>
-        </p:spPr>
-        <p:style>
-          <a:lnRef idx="1">
-            <a:schemeClr val="accent1"/>
-          </a:lnRef>
-          <a:fillRef idx="0">
-            <a:schemeClr val="accent1"/>
-          </a:fillRef>
-          <a:effectRef idx="0">
-            <a:schemeClr val="accent1"/>
-          </a:effectRef>
-          <a:fontRef idx="minor">
-            <a:schemeClr val="tx1"/>
-          </a:fontRef>
-        </p:style>
-      </p:cxnSp>
-      <p:sp>
-        <p:nvSpPr>
-          <p:cNvPr id="70" name="Tekstvak 69">
-            <a:extLst>
-              <a:ext uri="{FF2B5EF4-FFF2-40B4-BE49-F238E27FC236}">
-                <a16:creationId xmlns:a16="http://schemas.microsoft.com/office/drawing/2014/main" id="{45015B53-AAEA-C993-2AD3-6FEE70004968}"/>
+              <a:t>0</a:t>
+            </a:r>
+          </a:p>
+        </p:txBody>
+      </p:sp>
+      <p:sp>
+        <p:nvSpPr>
+          <p:cNvPr id="29" name="Tekstvak 28">
+            <a:extLst>
+              <a:ext uri="{FF2B5EF4-FFF2-40B4-BE49-F238E27FC236}">
+                <a16:creationId xmlns:a16="http://schemas.microsoft.com/office/drawing/2014/main" id="{6762AB49-E635-0A9A-8D1D-B001E115F5BF}"/>
               </a:ext>
             </a:extLst>
           </p:cNvPr>
@@ -6432,8 +5293,8 @@
         </p:nvSpPr>
         <p:spPr>
           <a:xfrm>
-            <a:off x="2181108" y="1609090"/>
-            <a:ext cx="1377237" cy="338554"/>
+            <a:off x="6714147" y="2788088"/>
+            <a:ext cx="301686" cy="369332"/>
           </a:xfrm>
           <a:prstGeom prst="rect">
             <a:avLst/>
@@ -6447,19 +5308,22 @@
           <a:lstStyle/>
           <a:p>
             <a:r>
-              <a:rPr lang="nl-NL" sz="1600" dirty="0" err="1"/>
-              <a:t>undetermined</a:t>
-            </a:r>
-            <a:endParaRPr lang="nl-NL" dirty="0"/>
-          </a:p>
-        </p:txBody>
-      </p:sp>
-      <p:sp>
-        <p:nvSpPr>
-          <p:cNvPr id="71" name="Tekstvak 70">
-            <a:extLst>
-              <a:ext uri="{FF2B5EF4-FFF2-40B4-BE49-F238E27FC236}">
-                <a16:creationId xmlns:a16="http://schemas.microsoft.com/office/drawing/2014/main" id="{50BD68C0-87AD-C0C8-29F4-AFD0BEE698A1}"/>
+              <a:rPr lang="nl-NL" dirty="0">
+                <a:latin typeface="CMU Serif Roman" panose="02000603000000000000" pitchFamily="2" charset="0"/>
+                <a:ea typeface="CMU Serif Roman" panose="02000603000000000000" pitchFamily="2" charset="0"/>
+                <a:cs typeface="CMU Serif Roman" panose="02000603000000000000" pitchFamily="2" charset="0"/>
+              </a:rPr>
+              <a:t>1</a:t>
+            </a:r>
+          </a:p>
+        </p:txBody>
+      </p:sp>
+      <p:sp>
+        <p:nvSpPr>
+          <p:cNvPr id="30" name="Tekstvak 29">
+            <a:extLst>
+              <a:ext uri="{FF2B5EF4-FFF2-40B4-BE49-F238E27FC236}">
+                <a16:creationId xmlns:a16="http://schemas.microsoft.com/office/drawing/2014/main" id="{7D099C8F-CEA7-A617-1B76-C16C03A2C090}"/>
               </a:ext>
             </a:extLst>
           </p:cNvPr>
@@ -6468,8 +5332,8 @@
         </p:nvSpPr>
         <p:spPr>
           <a:xfrm>
-            <a:off x="5570301" y="1170203"/>
-            <a:ext cx="752129" cy="369332"/>
+            <a:off x="7230420" y="2788088"/>
+            <a:ext cx="301686" cy="369332"/>
           </a:xfrm>
           <a:prstGeom prst="rect">
             <a:avLst/>
@@ -6482,203 +5346,23 @@
           </a:bodyPr>
           <a:lstStyle/>
           <a:p>
-            <a:pPr/>
-            <a:r>
-              <a:rPr lang="nl-NL" i="1" dirty="0">
-                <a:latin typeface="CMU Serif" panose="02000603000000000000" pitchFamily="2" charset="0"/>
-                <a:ea typeface="CMU Serif" panose="02000603000000000000" pitchFamily="2" charset="0"/>
-                <a:cs typeface="CMU Serif" panose="02000603000000000000" pitchFamily="2" charset="0"/>
+            <a:r>
+              <a:rPr lang="nl-NL" dirty="0">
+                <a:latin typeface="CMU Serif Roman" panose="02000603000000000000" pitchFamily="2" charset="0"/>
+                <a:ea typeface="CMU Serif Roman" panose="02000603000000000000" pitchFamily="2" charset="0"/>
+                <a:cs typeface="CMU Serif Roman" panose="02000603000000000000" pitchFamily="2" charset="0"/>
               </a:rPr>
-              <a:t>k &lt; d</a:t>
-            </a:r>
-          </a:p>
-        </p:txBody>
-      </p:sp>
-      <p:cxnSp>
-        <p:nvCxnSpPr>
-          <p:cNvPr id="2" name="Rechte verbindingslijn 1">
-            <a:extLst>
-              <a:ext uri="{FF2B5EF4-FFF2-40B4-BE49-F238E27FC236}">
-                <a16:creationId xmlns:a16="http://schemas.microsoft.com/office/drawing/2014/main" id="{D8D9ADCD-3B26-AFBD-D566-542ABFB1D78C}"/>
-              </a:ext>
-            </a:extLst>
-          </p:cNvPr>
-          <p:cNvCxnSpPr>
-            <a:cxnSpLocks/>
-          </p:cNvCxnSpPr>
-          <p:nvPr/>
-        </p:nvCxnSpPr>
-        <p:spPr>
-          <a:xfrm>
-            <a:off x="6126809" y="2188029"/>
-            <a:ext cx="1749094" cy="0"/>
-          </a:xfrm>
-          <a:prstGeom prst="line">
-            <a:avLst/>
-          </a:prstGeom>
-          <a:ln w="19050">
-            <a:solidFill>
-              <a:schemeClr val="tx1"/>
-            </a:solidFill>
-            <a:prstDash val="sysDot"/>
-          </a:ln>
-        </p:spPr>
-        <p:style>
-          <a:lnRef idx="1">
-            <a:schemeClr val="accent1"/>
-          </a:lnRef>
-          <a:fillRef idx="0">
-            <a:schemeClr val="accent1"/>
-          </a:fillRef>
-          <a:effectRef idx="0">
-            <a:schemeClr val="accent1"/>
-          </a:effectRef>
-          <a:fontRef idx="minor">
-            <a:schemeClr val="tx1"/>
-          </a:fontRef>
-        </p:style>
-      </p:cxnSp>
-      <p:cxnSp>
-        <p:nvCxnSpPr>
-          <p:cNvPr id="3" name="Rechte verbindingslijn 2">
-            <a:extLst>
-              <a:ext uri="{FF2B5EF4-FFF2-40B4-BE49-F238E27FC236}">
-                <a16:creationId xmlns:a16="http://schemas.microsoft.com/office/drawing/2014/main" id="{6D78962D-9C67-248D-F176-37FEB8DB9B0D}"/>
-              </a:ext>
-            </a:extLst>
-          </p:cNvPr>
-          <p:cNvCxnSpPr>
-            <a:cxnSpLocks/>
-          </p:cNvCxnSpPr>
-          <p:nvPr/>
-        </p:nvCxnSpPr>
-        <p:spPr>
-          <a:xfrm>
-            <a:off x="6126809" y="2544490"/>
-            <a:ext cx="1749094" cy="0"/>
-          </a:xfrm>
-          <a:prstGeom prst="line">
-            <a:avLst/>
-          </a:prstGeom>
-          <a:ln w="19050">
-            <a:solidFill>
-              <a:schemeClr val="tx1"/>
-            </a:solidFill>
-            <a:prstDash val="sysDot"/>
-          </a:ln>
-        </p:spPr>
-        <p:style>
-          <a:lnRef idx="1">
-            <a:schemeClr val="accent1"/>
-          </a:lnRef>
-          <a:fillRef idx="0">
-            <a:schemeClr val="accent1"/>
-          </a:fillRef>
-          <a:effectRef idx="0">
-            <a:schemeClr val="accent1"/>
-          </a:effectRef>
-          <a:fontRef idx="minor">
-            <a:schemeClr val="tx1"/>
-          </a:fontRef>
-        </p:style>
-      </p:cxnSp>
-      <p:cxnSp>
-        <p:nvCxnSpPr>
-          <p:cNvPr id="4" name="Rechte verbindingslijn 3">
-            <a:extLst>
-              <a:ext uri="{FF2B5EF4-FFF2-40B4-BE49-F238E27FC236}">
-                <a16:creationId xmlns:a16="http://schemas.microsoft.com/office/drawing/2014/main" id="{3D476F8E-9145-B05A-3F78-09BF66CDB039}"/>
-              </a:ext>
-            </a:extLst>
-          </p:cNvPr>
-          <p:cNvCxnSpPr>
-            <a:cxnSpLocks/>
-          </p:cNvCxnSpPr>
-          <p:nvPr/>
-        </p:nvCxnSpPr>
-        <p:spPr>
-          <a:xfrm>
-            <a:off x="6376494" y="2362385"/>
-            <a:ext cx="452035" cy="0"/>
-          </a:xfrm>
-          <a:prstGeom prst="line">
-            <a:avLst/>
-          </a:prstGeom>
-          <a:ln w="19050">
-            <a:solidFill>
-              <a:schemeClr val="tx1"/>
-            </a:solidFill>
-            <a:prstDash val="solid"/>
-            <a:headEnd type="oval"/>
-          </a:ln>
-        </p:spPr>
-        <p:style>
-          <a:lnRef idx="1">
-            <a:schemeClr val="accent1"/>
-          </a:lnRef>
-          <a:fillRef idx="0">
-            <a:schemeClr val="accent1"/>
-          </a:fillRef>
-          <a:effectRef idx="0">
-            <a:schemeClr val="accent1"/>
-          </a:effectRef>
-          <a:fontRef idx="minor">
-            <a:schemeClr val="tx1"/>
-          </a:fontRef>
-        </p:style>
-      </p:cxnSp>
-      <p:cxnSp>
-        <p:nvCxnSpPr>
-          <p:cNvPr id="8" name="Rechte verbindingslijn 7">
-            <a:extLst>
-              <a:ext uri="{FF2B5EF4-FFF2-40B4-BE49-F238E27FC236}">
-                <a16:creationId xmlns:a16="http://schemas.microsoft.com/office/drawing/2014/main" id="{489F8CEA-C7EC-DFA0-2B2E-E1DA765054EA}"/>
-              </a:ext>
-            </a:extLst>
-          </p:cNvPr>
-          <p:cNvCxnSpPr>
-            <a:cxnSpLocks/>
-          </p:cNvCxnSpPr>
-          <p:nvPr/>
-        </p:nvCxnSpPr>
-        <p:spPr>
-          <a:xfrm>
-            <a:off x="6846144" y="2371241"/>
-            <a:ext cx="520728" cy="0"/>
-          </a:xfrm>
-          <a:prstGeom prst="line">
-            <a:avLst/>
-          </a:prstGeom>
-          <a:ln w="19050">
-            <a:solidFill>
-              <a:schemeClr val="tx1"/>
-            </a:solidFill>
-            <a:prstDash val="solid"/>
-            <a:headEnd type="oval"/>
-            <a:tailEnd type="oval"/>
-          </a:ln>
-        </p:spPr>
-        <p:style>
-          <a:lnRef idx="1">
-            <a:schemeClr val="accent1"/>
-          </a:lnRef>
-          <a:fillRef idx="0">
-            <a:schemeClr val="accent1"/>
-          </a:fillRef>
-          <a:effectRef idx="0">
-            <a:schemeClr val="accent1"/>
-          </a:effectRef>
-          <a:fontRef idx="minor">
-            <a:schemeClr val="tx1"/>
-          </a:fontRef>
-        </p:style>
-      </p:cxnSp>
-      <p:sp>
-        <p:nvSpPr>
-          <p:cNvPr id="9" name="Tekstvak 8">
-            <a:extLst>
-              <a:ext uri="{FF2B5EF4-FFF2-40B4-BE49-F238E27FC236}">
-                <a16:creationId xmlns:a16="http://schemas.microsoft.com/office/drawing/2014/main" id="{65FE83F7-D120-B98C-D58E-B4B45766C55D}"/>
+              <a:t>2</a:t>
+            </a:r>
+          </a:p>
+        </p:txBody>
+      </p:sp>
+      <p:sp>
+        <p:nvSpPr>
+          <p:cNvPr id="31" name="Tekstvak 30">
+            <a:extLst>
+              <a:ext uri="{FF2B5EF4-FFF2-40B4-BE49-F238E27FC236}">
+                <a16:creationId xmlns:a16="http://schemas.microsoft.com/office/drawing/2014/main" id="{0DE50E04-5B6B-E623-2E13-65326F10E976}"/>
               </a:ext>
             </a:extLst>
           </p:cNvPr>
@@ -6687,8 +5371,8 @@
         </p:nvSpPr>
         <p:spPr>
           <a:xfrm>
-            <a:off x="6529702" y="3052650"/>
-            <a:ext cx="665567" cy="369332"/>
+            <a:off x="4349717" y="1603216"/>
+            <a:ext cx="1188146" cy="338554"/>
           </a:xfrm>
           <a:prstGeom prst="rect">
             <a:avLst/>
@@ -6702,112 +5386,27 @@
           <a:lstStyle/>
           <a:p>
             <a:r>
-              <a:rPr lang="nl-NL" i="1" dirty="0">
-                <a:latin typeface="CMU Serif" panose="02000603000000000000" pitchFamily="2" charset="0"/>
-                <a:ea typeface="CMU Serif" panose="02000603000000000000" pitchFamily="2" charset="0"/>
-                <a:cs typeface="CMU Serif" panose="02000603000000000000" pitchFamily="2" charset="0"/>
+              <a:rPr lang="nl-NL" sz="1600" dirty="0" err="1">
+                <a:latin typeface="CMU Serif Roman" panose="02000603000000000000" pitchFamily="2" charset="0"/>
+                <a:ea typeface="CMU Serif Roman" panose="02000603000000000000" pitchFamily="2" charset="0"/>
+                <a:cs typeface="CMU Serif Roman" panose="02000603000000000000" pitchFamily="2" charset="0"/>
               </a:rPr>
-              <a:t>k - d</a:t>
-            </a:r>
-          </a:p>
-        </p:txBody>
-      </p:sp>
-      <p:cxnSp>
-        <p:nvCxnSpPr>
-          <p:cNvPr id="10" name="Rechte verbindingslijn 9">
-            <a:extLst>
-              <a:ext uri="{FF2B5EF4-FFF2-40B4-BE49-F238E27FC236}">
-                <a16:creationId xmlns:a16="http://schemas.microsoft.com/office/drawing/2014/main" id="{E9160A06-17A9-B8B1-0533-B4D7ACC15BF7}"/>
-              </a:ext>
-            </a:extLst>
-          </p:cNvPr>
-          <p:cNvCxnSpPr>
-            <a:cxnSpLocks/>
-          </p:cNvCxnSpPr>
-          <p:nvPr/>
-        </p:nvCxnSpPr>
-        <p:spPr>
-          <a:xfrm flipV="1">
-            <a:off x="6126809" y="1928156"/>
-            <a:ext cx="0" cy="846041"/>
-          </a:xfrm>
-          <a:prstGeom prst="line">
-            <a:avLst/>
-          </a:prstGeom>
-          <a:ln w="19050">
-            <a:solidFill>
-              <a:schemeClr val="tx1"/>
-            </a:solidFill>
-            <a:prstDash val="solid"/>
-            <a:headEnd type="none"/>
-          </a:ln>
-        </p:spPr>
-        <p:style>
-          <a:lnRef idx="1">
-            <a:schemeClr val="accent1"/>
-          </a:lnRef>
-          <a:fillRef idx="0">
-            <a:schemeClr val="accent1"/>
-          </a:fillRef>
-          <a:effectRef idx="0">
-            <a:schemeClr val="accent1"/>
-          </a:effectRef>
-          <a:fontRef idx="minor">
-            <a:schemeClr val="tx1"/>
-          </a:fontRef>
-        </p:style>
-      </p:cxnSp>
-      <p:cxnSp>
-        <p:nvCxnSpPr>
-          <p:cNvPr id="11" name="Rechte verbindingslijn 10">
-            <a:extLst>
-              <a:ext uri="{FF2B5EF4-FFF2-40B4-BE49-F238E27FC236}">
-                <a16:creationId xmlns:a16="http://schemas.microsoft.com/office/drawing/2014/main" id="{F5FFC99C-4486-671D-6350-52D5364D0B74}"/>
-              </a:ext>
-            </a:extLst>
-          </p:cNvPr>
-          <p:cNvCxnSpPr>
-            <a:cxnSpLocks/>
-          </p:cNvCxnSpPr>
-          <p:nvPr/>
-        </p:nvCxnSpPr>
-        <p:spPr>
-          <a:xfrm flipH="1">
-            <a:off x="6117595" y="2774197"/>
-            <a:ext cx="1749094" cy="0"/>
-          </a:xfrm>
-          <a:prstGeom prst="line">
-            <a:avLst/>
-          </a:prstGeom>
-          <a:ln w="19050">
-            <a:solidFill>
-              <a:schemeClr val="tx1"/>
-            </a:solidFill>
-            <a:prstDash val="solid"/>
-            <a:headEnd type="none"/>
-          </a:ln>
-        </p:spPr>
-        <p:style>
-          <a:lnRef idx="1">
-            <a:schemeClr val="accent1"/>
-          </a:lnRef>
-          <a:fillRef idx="0">
-            <a:schemeClr val="accent1"/>
-          </a:fillRef>
-          <a:effectRef idx="0">
-            <a:schemeClr val="accent1"/>
-          </a:effectRef>
-          <a:fontRef idx="minor">
-            <a:schemeClr val="tx1"/>
-          </a:fontRef>
-        </p:style>
-      </p:cxnSp>
-      <p:sp>
-        <p:nvSpPr>
-          <p:cNvPr id="13" name="Tekstvak 12">
-            <a:extLst>
-              <a:ext uri="{FF2B5EF4-FFF2-40B4-BE49-F238E27FC236}">
-                <a16:creationId xmlns:a16="http://schemas.microsoft.com/office/drawing/2014/main" id="{0A81C907-8A47-7934-54C5-036D2DD258AB}"/>
+              <a:t>determined</a:t>
+            </a:r>
+            <a:endParaRPr lang="nl-NL" dirty="0">
+              <a:latin typeface="CMU Serif Roman" panose="02000603000000000000" pitchFamily="2" charset="0"/>
+              <a:ea typeface="CMU Serif Roman" panose="02000603000000000000" pitchFamily="2" charset="0"/>
+              <a:cs typeface="CMU Serif Roman" panose="02000603000000000000" pitchFamily="2" charset="0"/>
+            </a:endParaRPr>
+          </a:p>
+        </p:txBody>
+      </p:sp>
+      <p:sp>
+        <p:nvSpPr>
+          <p:cNvPr id="32" name="Tekstvak 31">
+            <a:extLst>
+              <a:ext uri="{FF2B5EF4-FFF2-40B4-BE49-F238E27FC236}">
+                <a16:creationId xmlns:a16="http://schemas.microsoft.com/office/drawing/2014/main" id="{96C423E9-36F2-BABB-31E1-89007B23C014}"/>
               </a:ext>
             </a:extLst>
           </p:cNvPr>
@@ -6816,8 +5415,8 @@
         </p:nvSpPr>
         <p:spPr>
           <a:xfrm>
-            <a:off x="7233535" y="3048335"/>
-            <a:ext cx="290464" cy="369332"/>
+            <a:off x="2529117" y="1173366"/>
+            <a:ext cx="752129" cy="369332"/>
           </a:xfrm>
           <a:prstGeom prst="rect">
             <a:avLst/>
@@ -6830,568 +5429,6 @@
           </a:bodyPr>
           <a:lstStyle/>
           <a:p>
-            <a:r>
-              <a:rPr lang="nl-NL" i="1" dirty="0">
-                <a:latin typeface="CMU Serif" panose="02000603000000000000" pitchFamily="2" charset="0"/>
-                <a:ea typeface="CMU Serif" panose="02000603000000000000" pitchFamily="2" charset="0"/>
-                <a:cs typeface="CMU Serif" panose="02000603000000000000" pitchFamily="2" charset="0"/>
-              </a:rPr>
-              <a:t>k</a:t>
-            </a:r>
-          </a:p>
-        </p:txBody>
-      </p:sp>
-      <p:cxnSp>
-        <p:nvCxnSpPr>
-          <p:cNvPr id="14" name="Rechte verbindingslijn 13">
-            <a:extLst>
-              <a:ext uri="{FF2B5EF4-FFF2-40B4-BE49-F238E27FC236}">
-                <a16:creationId xmlns:a16="http://schemas.microsoft.com/office/drawing/2014/main" id="{B8934F11-8482-910D-97D2-6B23BBC44877}"/>
-              </a:ext>
-            </a:extLst>
-          </p:cNvPr>
-          <p:cNvCxnSpPr>
-            <a:cxnSpLocks/>
-          </p:cNvCxnSpPr>
-          <p:nvPr/>
-        </p:nvCxnSpPr>
-        <p:spPr>
-          <a:xfrm flipV="1">
-            <a:off x="6380317" y="2734759"/>
-            <a:ext cx="0" cy="78875"/>
-          </a:xfrm>
-          <a:prstGeom prst="line">
-            <a:avLst/>
-          </a:prstGeom>
-          <a:ln w="19050">
-            <a:solidFill>
-              <a:schemeClr val="tx1"/>
-            </a:solidFill>
-            <a:prstDash val="solid"/>
-            <a:headEnd type="none"/>
-          </a:ln>
-        </p:spPr>
-        <p:style>
-          <a:lnRef idx="1">
-            <a:schemeClr val="accent1"/>
-          </a:lnRef>
-          <a:fillRef idx="0">
-            <a:schemeClr val="accent1"/>
-          </a:fillRef>
-          <a:effectRef idx="0">
-            <a:schemeClr val="accent1"/>
-          </a:effectRef>
-          <a:fontRef idx="minor">
-            <a:schemeClr val="tx1"/>
-          </a:fontRef>
-        </p:style>
-      </p:cxnSp>
-      <p:cxnSp>
-        <p:nvCxnSpPr>
-          <p:cNvPr id="16" name="Rechte verbindingslijn 15">
-            <a:extLst>
-              <a:ext uri="{FF2B5EF4-FFF2-40B4-BE49-F238E27FC236}">
-                <a16:creationId xmlns:a16="http://schemas.microsoft.com/office/drawing/2014/main" id="{1561ED2E-57A3-632D-C25F-4D9DCC98C1DD}"/>
-              </a:ext>
-            </a:extLst>
-          </p:cNvPr>
-          <p:cNvCxnSpPr>
-            <a:cxnSpLocks/>
-          </p:cNvCxnSpPr>
-          <p:nvPr/>
-        </p:nvCxnSpPr>
-        <p:spPr>
-          <a:xfrm flipV="1">
-            <a:off x="6846144" y="2740510"/>
-            <a:ext cx="0" cy="78875"/>
-          </a:xfrm>
-          <a:prstGeom prst="line">
-            <a:avLst/>
-          </a:prstGeom>
-          <a:ln w="19050">
-            <a:solidFill>
-              <a:schemeClr val="tx1"/>
-            </a:solidFill>
-            <a:prstDash val="solid"/>
-            <a:headEnd type="none"/>
-          </a:ln>
-        </p:spPr>
-        <p:style>
-          <a:lnRef idx="1">
-            <a:schemeClr val="accent1"/>
-          </a:lnRef>
-          <a:fillRef idx="0">
-            <a:schemeClr val="accent1"/>
-          </a:fillRef>
-          <a:effectRef idx="0">
-            <a:schemeClr val="accent1"/>
-          </a:effectRef>
-          <a:fontRef idx="minor">
-            <a:schemeClr val="tx1"/>
-          </a:fontRef>
-        </p:style>
-      </p:cxnSp>
-      <p:cxnSp>
-        <p:nvCxnSpPr>
-          <p:cNvPr id="17" name="Rechte verbindingslijn 16">
-            <a:extLst>
-              <a:ext uri="{FF2B5EF4-FFF2-40B4-BE49-F238E27FC236}">
-                <a16:creationId xmlns:a16="http://schemas.microsoft.com/office/drawing/2014/main" id="{952A0E03-09C7-6900-EAFD-704A9677205F}"/>
-              </a:ext>
-            </a:extLst>
-          </p:cNvPr>
-          <p:cNvCxnSpPr>
-            <a:cxnSpLocks/>
-          </p:cNvCxnSpPr>
-          <p:nvPr/>
-        </p:nvCxnSpPr>
-        <p:spPr>
-          <a:xfrm flipV="1">
-            <a:off x="7363729" y="2740510"/>
-            <a:ext cx="0" cy="78875"/>
-          </a:xfrm>
-          <a:prstGeom prst="line">
-            <a:avLst/>
-          </a:prstGeom>
-          <a:ln w="19050">
-            <a:solidFill>
-              <a:schemeClr val="tx1"/>
-            </a:solidFill>
-            <a:prstDash val="solid"/>
-            <a:headEnd type="none"/>
-          </a:ln>
-        </p:spPr>
-        <p:style>
-          <a:lnRef idx="1">
-            <a:schemeClr val="accent1"/>
-          </a:lnRef>
-          <a:fillRef idx="0">
-            <a:schemeClr val="accent1"/>
-          </a:fillRef>
-          <a:effectRef idx="0">
-            <a:schemeClr val="accent1"/>
-          </a:effectRef>
-          <a:fontRef idx="minor">
-            <a:schemeClr val="tx1"/>
-          </a:fontRef>
-        </p:style>
-      </p:cxnSp>
-      <p:sp>
-        <p:nvSpPr>
-          <p:cNvPr id="20" name="Tekstvak 19">
-            <a:extLst>
-              <a:ext uri="{FF2B5EF4-FFF2-40B4-BE49-F238E27FC236}">
-                <a16:creationId xmlns:a16="http://schemas.microsoft.com/office/drawing/2014/main" id="{43DF2FBA-F408-41AE-9FB1-3326A2FA7FEF}"/>
-              </a:ext>
-            </a:extLst>
-          </p:cNvPr>
-          <p:cNvSpPr txBox="1"/>
-          <p:nvPr/>
-        </p:nvSpPr>
-        <p:spPr>
-          <a:xfrm>
-            <a:off x="6303523" y="1603216"/>
-            <a:ext cx="1377237" cy="338554"/>
-          </a:xfrm>
-          <a:prstGeom prst="rect">
-            <a:avLst/>
-          </a:prstGeom>
-          <a:noFill/>
-        </p:spPr>
-        <p:txBody>
-          <a:bodyPr wrap="none" rtlCol="0">
-            <a:spAutoFit/>
-          </a:bodyPr>
-          <a:lstStyle/>
-          <a:p>
-            <a:r>
-              <a:rPr lang="nl-NL" sz="1600" dirty="0" err="1"/>
-              <a:t>undetermined</a:t>
-            </a:r>
-            <a:endParaRPr lang="nl-NL" dirty="0"/>
-          </a:p>
-        </p:txBody>
-      </p:sp>
-      <p:sp>
-        <p:nvSpPr>
-          <p:cNvPr id="21" name="Tekstvak 20">
-            <a:extLst>
-              <a:ext uri="{FF2B5EF4-FFF2-40B4-BE49-F238E27FC236}">
-                <a16:creationId xmlns:a16="http://schemas.microsoft.com/office/drawing/2014/main" id="{33293874-40BA-2E99-970D-61B1F7B4E73B}"/>
-              </a:ext>
-            </a:extLst>
-          </p:cNvPr>
-          <p:cNvSpPr txBox="1"/>
-          <p:nvPr/>
-        </p:nvSpPr>
-        <p:spPr>
-          <a:xfrm>
-            <a:off x="2138027" y="2788088"/>
-            <a:ext cx="301686" cy="369332"/>
-          </a:xfrm>
-          <a:prstGeom prst="rect">
-            <a:avLst/>
-          </a:prstGeom>
-          <a:noFill/>
-        </p:spPr>
-        <p:txBody>
-          <a:bodyPr wrap="none" rtlCol="0">
-            <a:spAutoFit/>
-          </a:bodyPr>
-          <a:lstStyle/>
-          <a:p>
-            <a:r>
-              <a:rPr lang="nl-NL" dirty="0"/>
-              <a:t>0</a:t>
-            </a:r>
-          </a:p>
-        </p:txBody>
-      </p:sp>
-      <p:sp>
-        <p:nvSpPr>
-          <p:cNvPr id="22" name="Tekstvak 21">
-            <a:extLst>
-              <a:ext uri="{FF2B5EF4-FFF2-40B4-BE49-F238E27FC236}">
-                <a16:creationId xmlns:a16="http://schemas.microsoft.com/office/drawing/2014/main" id="{A1C651B6-1644-AFEC-A44E-D5F3C9453320}"/>
-              </a:ext>
-            </a:extLst>
-          </p:cNvPr>
-          <p:cNvSpPr txBox="1"/>
-          <p:nvPr/>
-        </p:nvSpPr>
-        <p:spPr>
-          <a:xfrm>
-            <a:off x="2610233" y="2788088"/>
-            <a:ext cx="301686" cy="369332"/>
-          </a:xfrm>
-          <a:prstGeom prst="rect">
-            <a:avLst/>
-          </a:prstGeom>
-          <a:noFill/>
-        </p:spPr>
-        <p:txBody>
-          <a:bodyPr wrap="none" rtlCol="0">
-            <a:spAutoFit/>
-          </a:bodyPr>
-          <a:lstStyle/>
-          <a:p>
-            <a:r>
-              <a:rPr lang="nl-NL" dirty="0"/>
-              <a:t>1</a:t>
-            </a:r>
-          </a:p>
-        </p:txBody>
-      </p:sp>
-      <p:sp>
-        <p:nvSpPr>
-          <p:cNvPr id="23" name="Tekstvak 22">
-            <a:extLst>
-              <a:ext uri="{FF2B5EF4-FFF2-40B4-BE49-F238E27FC236}">
-                <a16:creationId xmlns:a16="http://schemas.microsoft.com/office/drawing/2014/main" id="{0B8A4DB0-2BC1-0537-699F-3067E030F1EE}"/>
-              </a:ext>
-            </a:extLst>
-          </p:cNvPr>
-          <p:cNvSpPr txBox="1"/>
-          <p:nvPr/>
-        </p:nvSpPr>
-        <p:spPr>
-          <a:xfrm>
-            <a:off x="3126506" y="2788088"/>
-            <a:ext cx="301686" cy="369332"/>
-          </a:xfrm>
-          <a:prstGeom prst="rect">
-            <a:avLst/>
-          </a:prstGeom>
-          <a:noFill/>
-        </p:spPr>
-        <p:txBody>
-          <a:bodyPr wrap="none" rtlCol="0">
-            <a:spAutoFit/>
-          </a:bodyPr>
-          <a:lstStyle/>
-          <a:p>
-            <a:r>
-              <a:rPr lang="nl-NL" dirty="0"/>
-              <a:t>2</a:t>
-            </a:r>
-          </a:p>
-        </p:txBody>
-      </p:sp>
-      <p:sp>
-        <p:nvSpPr>
-          <p:cNvPr id="24" name="Tekstvak 23">
-            <a:extLst>
-              <a:ext uri="{FF2B5EF4-FFF2-40B4-BE49-F238E27FC236}">
-                <a16:creationId xmlns:a16="http://schemas.microsoft.com/office/drawing/2014/main" id="{6918DCF9-04DF-8505-C95E-76DF577FE0FA}"/>
-              </a:ext>
-            </a:extLst>
-          </p:cNvPr>
-          <p:cNvSpPr txBox="1"/>
-          <p:nvPr/>
-        </p:nvSpPr>
-        <p:spPr>
-          <a:xfrm>
-            <a:off x="4173655" y="2788088"/>
-            <a:ext cx="301686" cy="369332"/>
-          </a:xfrm>
-          <a:prstGeom prst="rect">
-            <a:avLst/>
-          </a:prstGeom>
-          <a:noFill/>
-        </p:spPr>
-        <p:txBody>
-          <a:bodyPr wrap="none" rtlCol="0">
-            <a:spAutoFit/>
-          </a:bodyPr>
-          <a:lstStyle/>
-          <a:p>
-            <a:r>
-              <a:rPr lang="nl-NL" dirty="0"/>
-              <a:t>0</a:t>
-            </a:r>
-          </a:p>
-        </p:txBody>
-      </p:sp>
-      <p:sp>
-        <p:nvSpPr>
-          <p:cNvPr id="25" name="Tekstvak 24">
-            <a:extLst>
-              <a:ext uri="{FF2B5EF4-FFF2-40B4-BE49-F238E27FC236}">
-                <a16:creationId xmlns:a16="http://schemas.microsoft.com/office/drawing/2014/main" id="{73ACB221-9439-839B-1941-DC5C5EA10D0A}"/>
-              </a:ext>
-            </a:extLst>
-          </p:cNvPr>
-          <p:cNvSpPr txBox="1"/>
-          <p:nvPr/>
-        </p:nvSpPr>
-        <p:spPr>
-          <a:xfrm>
-            <a:off x="4645861" y="2788088"/>
-            <a:ext cx="301686" cy="369332"/>
-          </a:xfrm>
-          <a:prstGeom prst="rect">
-            <a:avLst/>
-          </a:prstGeom>
-          <a:noFill/>
-        </p:spPr>
-        <p:txBody>
-          <a:bodyPr wrap="none" rtlCol="0">
-            <a:spAutoFit/>
-          </a:bodyPr>
-          <a:lstStyle/>
-          <a:p>
-            <a:r>
-              <a:rPr lang="nl-NL" dirty="0"/>
-              <a:t>1</a:t>
-            </a:r>
-          </a:p>
-        </p:txBody>
-      </p:sp>
-      <p:sp>
-        <p:nvSpPr>
-          <p:cNvPr id="26" name="Tekstvak 25">
-            <a:extLst>
-              <a:ext uri="{FF2B5EF4-FFF2-40B4-BE49-F238E27FC236}">
-                <a16:creationId xmlns:a16="http://schemas.microsoft.com/office/drawing/2014/main" id="{F72AA9A4-517C-810D-1B41-807737329D62}"/>
-              </a:ext>
-            </a:extLst>
-          </p:cNvPr>
-          <p:cNvSpPr txBox="1"/>
-          <p:nvPr/>
-        </p:nvSpPr>
-        <p:spPr>
-          <a:xfrm>
-            <a:off x="5162134" y="2788088"/>
-            <a:ext cx="301686" cy="369332"/>
-          </a:xfrm>
-          <a:prstGeom prst="rect">
-            <a:avLst/>
-          </a:prstGeom>
-          <a:noFill/>
-        </p:spPr>
-        <p:txBody>
-          <a:bodyPr wrap="none" rtlCol="0">
-            <a:spAutoFit/>
-          </a:bodyPr>
-          <a:lstStyle/>
-          <a:p>
-            <a:r>
-              <a:rPr lang="nl-NL" dirty="0"/>
-              <a:t>2</a:t>
-            </a:r>
-          </a:p>
-        </p:txBody>
-      </p:sp>
-      <p:sp>
-        <p:nvSpPr>
-          <p:cNvPr id="27" name="Tekstvak 26">
-            <a:extLst>
-              <a:ext uri="{FF2B5EF4-FFF2-40B4-BE49-F238E27FC236}">
-                <a16:creationId xmlns:a16="http://schemas.microsoft.com/office/drawing/2014/main" id="{5D14AF00-64B0-DEAA-9AE7-D5407C0F53DC}"/>
-              </a:ext>
-            </a:extLst>
-          </p:cNvPr>
-          <p:cNvSpPr txBox="1"/>
-          <p:nvPr/>
-        </p:nvSpPr>
-        <p:spPr>
-          <a:xfrm>
-            <a:off x="6241941" y="2788088"/>
-            <a:ext cx="301686" cy="369332"/>
-          </a:xfrm>
-          <a:prstGeom prst="rect">
-            <a:avLst/>
-          </a:prstGeom>
-          <a:noFill/>
-        </p:spPr>
-        <p:txBody>
-          <a:bodyPr wrap="none" rtlCol="0">
-            <a:spAutoFit/>
-          </a:bodyPr>
-          <a:lstStyle/>
-          <a:p>
-            <a:r>
-              <a:rPr lang="nl-NL" dirty="0"/>
-              <a:t>0</a:t>
-            </a:r>
-          </a:p>
-        </p:txBody>
-      </p:sp>
-      <p:sp>
-        <p:nvSpPr>
-          <p:cNvPr id="29" name="Tekstvak 28">
-            <a:extLst>
-              <a:ext uri="{FF2B5EF4-FFF2-40B4-BE49-F238E27FC236}">
-                <a16:creationId xmlns:a16="http://schemas.microsoft.com/office/drawing/2014/main" id="{6762AB49-E635-0A9A-8D1D-B001E115F5BF}"/>
-              </a:ext>
-            </a:extLst>
-          </p:cNvPr>
-          <p:cNvSpPr txBox="1"/>
-          <p:nvPr/>
-        </p:nvSpPr>
-        <p:spPr>
-          <a:xfrm>
-            <a:off x="6714147" y="2788088"/>
-            <a:ext cx="301686" cy="369332"/>
-          </a:xfrm>
-          <a:prstGeom prst="rect">
-            <a:avLst/>
-          </a:prstGeom>
-          <a:noFill/>
-        </p:spPr>
-        <p:txBody>
-          <a:bodyPr wrap="none" rtlCol="0">
-            <a:spAutoFit/>
-          </a:bodyPr>
-          <a:lstStyle/>
-          <a:p>
-            <a:r>
-              <a:rPr lang="nl-NL" dirty="0"/>
-              <a:t>1</a:t>
-            </a:r>
-          </a:p>
-        </p:txBody>
-      </p:sp>
-      <p:sp>
-        <p:nvSpPr>
-          <p:cNvPr id="30" name="Tekstvak 29">
-            <a:extLst>
-              <a:ext uri="{FF2B5EF4-FFF2-40B4-BE49-F238E27FC236}">
-                <a16:creationId xmlns:a16="http://schemas.microsoft.com/office/drawing/2014/main" id="{7D099C8F-CEA7-A617-1B76-C16C03A2C090}"/>
-              </a:ext>
-            </a:extLst>
-          </p:cNvPr>
-          <p:cNvSpPr txBox="1"/>
-          <p:nvPr/>
-        </p:nvSpPr>
-        <p:spPr>
-          <a:xfrm>
-            <a:off x="7230420" y="2788088"/>
-            <a:ext cx="301686" cy="369332"/>
-          </a:xfrm>
-          <a:prstGeom prst="rect">
-            <a:avLst/>
-          </a:prstGeom>
-          <a:noFill/>
-        </p:spPr>
-        <p:txBody>
-          <a:bodyPr wrap="none" rtlCol="0">
-            <a:spAutoFit/>
-          </a:bodyPr>
-          <a:lstStyle/>
-          <a:p>
-            <a:r>
-              <a:rPr lang="nl-NL" dirty="0"/>
-              <a:t>2</a:t>
-            </a:r>
-          </a:p>
-        </p:txBody>
-      </p:sp>
-      <p:sp>
-        <p:nvSpPr>
-          <p:cNvPr id="31" name="Tekstvak 30">
-            <a:extLst>
-              <a:ext uri="{FF2B5EF4-FFF2-40B4-BE49-F238E27FC236}">
-                <a16:creationId xmlns:a16="http://schemas.microsoft.com/office/drawing/2014/main" id="{0DE50E04-5B6B-E623-2E13-65326F10E976}"/>
-              </a:ext>
-            </a:extLst>
-          </p:cNvPr>
-          <p:cNvSpPr txBox="1"/>
-          <p:nvPr/>
-        </p:nvSpPr>
-        <p:spPr>
-          <a:xfrm>
-            <a:off x="4349717" y="1603216"/>
-            <a:ext cx="1162434" cy="338554"/>
-          </a:xfrm>
-          <a:prstGeom prst="rect">
-            <a:avLst/>
-          </a:prstGeom>
-          <a:noFill/>
-        </p:spPr>
-        <p:txBody>
-          <a:bodyPr wrap="none" rtlCol="0">
-            <a:spAutoFit/>
-          </a:bodyPr>
-          <a:lstStyle/>
-          <a:p>
-            <a:r>
-              <a:rPr lang="nl-NL" sz="1600" dirty="0" err="1"/>
-              <a:t>determined</a:t>
-            </a:r>
-            <a:endParaRPr lang="nl-NL" dirty="0"/>
-          </a:p>
-        </p:txBody>
-      </p:sp>
-      <p:sp>
-        <p:nvSpPr>
-          <p:cNvPr id="32" name="Tekstvak 31">
-            <a:extLst>
-              <a:ext uri="{FF2B5EF4-FFF2-40B4-BE49-F238E27FC236}">
-                <a16:creationId xmlns:a16="http://schemas.microsoft.com/office/drawing/2014/main" id="{96C423E9-36F2-BABB-31E1-89007B23C014}"/>
-              </a:ext>
-            </a:extLst>
-          </p:cNvPr>
-          <p:cNvSpPr txBox="1"/>
-          <p:nvPr/>
-        </p:nvSpPr>
-        <p:spPr>
-          <a:xfrm>
-            <a:off x="2529117" y="1173366"/>
-            <a:ext cx="752129" cy="369332"/>
-          </a:xfrm>
-          <a:prstGeom prst="rect">
-            <a:avLst/>
-          </a:prstGeom>
-          <a:noFill/>
-        </p:spPr>
-        <p:txBody>
-          <a:bodyPr wrap="none" rtlCol="0">
-            <a:spAutoFit/>
-          </a:bodyPr>
-          <a:lstStyle/>
-          <a:p>
-            <a:pPr/>
             <a:r>
               <a:rPr lang="nl-NL" i="1" dirty="0">
                 <a:latin typeface="CMU Serif" panose="02000603000000000000" pitchFamily="2" charset="0"/>
@@ -7495,10 +5532,10 @@
       </p:cxnSp>
       <p:sp>
         <p:nvSpPr>
-          <p:cNvPr id="38" name="Tekstvak 37">
-            <a:extLst>
-              <a:ext uri="{FF2B5EF4-FFF2-40B4-BE49-F238E27FC236}">
-                <a16:creationId xmlns:a16="http://schemas.microsoft.com/office/drawing/2014/main" id="{7C349A3A-AF6E-18F5-E8C8-D2930CCF8BC9}"/>
+          <p:cNvPr id="18" name="Tekstvak 17">
+            <a:extLst>
+              <a:ext uri="{FF2B5EF4-FFF2-40B4-BE49-F238E27FC236}">
+                <a16:creationId xmlns:a16="http://schemas.microsoft.com/office/drawing/2014/main" id="{A48F5DB7-87B4-1CAA-676D-C8A71319DA6F}"/>
               </a:ext>
             </a:extLst>
           </p:cNvPr>
@@ -7507,8 +5544,8 @@
         </p:nvSpPr>
         <p:spPr>
           <a:xfrm>
-            <a:off x="1119252" y="2075638"/>
-            <a:ext cx="306494" cy="461665"/>
+            <a:off x="1333167" y="2062444"/>
+            <a:ext cx="320922" cy="461665"/>
           </a:xfrm>
           <a:prstGeom prst="rect">
             <a:avLst/>
@@ -7522,46 +5559,18 @@
           <a:lstStyle/>
           <a:p>
             <a:r>
-              <a:rPr lang="nl-NL" sz="2400" dirty="0" err="1"/>
+              <a:rPr lang="nl-NL" sz="2400" dirty="0">
+                <a:latin typeface="CMU Serif Roman" panose="02000603000000000000" pitchFamily="2" charset="0"/>
+                <a:ea typeface="CMU Serif Roman" panose="02000603000000000000" pitchFamily="2" charset="0"/>
+                <a:cs typeface="CMU Serif Roman" panose="02000603000000000000" pitchFamily="2" charset="0"/>
+              </a:rPr>
               <a:t>z</a:t>
             </a:r>
-            <a:endParaRPr lang="nl-NL" sz="2400" baseline="-25000" dirty="0"/>
-          </a:p>
-        </p:txBody>
-      </p:sp>
-      <p:sp>
-        <p:nvSpPr>
-          <p:cNvPr id="39" name="Tekstvak 38">
-            <a:extLst>
-              <a:ext uri="{FF2B5EF4-FFF2-40B4-BE49-F238E27FC236}">
-                <a16:creationId xmlns:a16="http://schemas.microsoft.com/office/drawing/2014/main" id="{9999FE4C-F08C-3FEB-452A-DBA30DA5A1C4}"/>
-              </a:ext>
-            </a:extLst>
-          </p:cNvPr>
-          <p:cNvSpPr txBox="1"/>
-          <p:nvPr/>
-        </p:nvSpPr>
-        <p:spPr>
-          <a:xfrm>
-            <a:off x="4512580" y="3469601"/>
-            <a:ext cx="756938" cy="461665"/>
-          </a:xfrm>
-          <a:prstGeom prst="rect">
-            <a:avLst/>
-          </a:prstGeom>
-          <a:noFill/>
-        </p:spPr>
-        <p:txBody>
-          <a:bodyPr wrap="none" rtlCol="0">
-            <a:spAutoFit/>
-          </a:bodyPr>
-          <a:lstStyle/>
-          <a:p>
-            <a:r>
-              <a:rPr lang="nl-NL" sz="2400" dirty="0"/>
-              <a:t>time</a:t>
-            </a:r>
-            <a:endParaRPr lang="nl-NL" sz="2400" baseline="-25000" dirty="0"/>
+            <a:endParaRPr lang="nl-NL" sz="1600" dirty="0">
+              <a:latin typeface="CMU Serif Roman" panose="02000603000000000000" pitchFamily="2" charset="0"/>
+              <a:ea typeface="CMU Serif Roman" panose="02000603000000000000" pitchFamily="2" charset="0"/>
+              <a:cs typeface="CMU Serif Roman" panose="02000603000000000000" pitchFamily="2" charset="0"/>
+            </a:endParaRPr>
           </a:p>
         </p:txBody>
       </p:sp>

</xml_diff>